<commit_message>
edits for short workshop
</commit_message>
<xml_diff>
--- a/learn-github/slides.pptx
+++ b/learn-github/slides.pptx
@@ -8,7 +8,7 @@
     <p:sldMasterId id="2147485227" r:id="rId4"/>
   </p:sldMasterIdLst>
   <p:notesMasterIdLst>
-    <p:notesMasterId r:id="rId38"/>
+    <p:notesMasterId r:id="rId31"/>
   </p:notesMasterIdLst>
   <p:sldIdLst>
     <p:sldId id="258" r:id="rId5"/>
@@ -25,30 +25,23 @@
     <p:sldId id="288" r:id="rId16"/>
     <p:sldId id="290" r:id="rId17"/>
     <p:sldId id="296" r:id="rId18"/>
-    <p:sldId id="308" r:id="rId19"/>
-    <p:sldId id="310" r:id="rId20"/>
-    <p:sldId id="312" r:id="rId21"/>
-    <p:sldId id="314" r:id="rId22"/>
-    <p:sldId id="316" r:id="rId23"/>
-    <p:sldId id="318" r:id="rId24"/>
-    <p:sldId id="320" r:id="rId25"/>
-    <p:sldId id="329" r:id="rId26"/>
-    <p:sldId id="330" r:id="rId27"/>
-    <p:sldId id="331" r:id="rId28"/>
-    <p:sldId id="332" r:id="rId29"/>
-    <p:sldId id="333" r:id="rId30"/>
-    <p:sldId id="334" r:id="rId31"/>
-    <p:sldId id="335" r:id="rId32"/>
-    <p:sldId id="336" r:id="rId33"/>
-    <p:sldId id="322" r:id="rId34"/>
-    <p:sldId id="324" r:id="rId35"/>
-    <p:sldId id="326" r:id="rId36"/>
-    <p:sldId id="328" r:id="rId37"/>
+    <p:sldId id="329" r:id="rId19"/>
+    <p:sldId id="308" r:id="rId20"/>
+    <p:sldId id="310" r:id="rId21"/>
+    <p:sldId id="312" r:id="rId22"/>
+    <p:sldId id="314" r:id="rId23"/>
+    <p:sldId id="316" r:id="rId24"/>
+    <p:sldId id="318" r:id="rId25"/>
+    <p:sldId id="320" r:id="rId26"/>
+    <p:sldId id="322" r:id="rId27"/>
+    <p:sldId id="324" r:id="rId28"/>
+    <p:sldId id="326" r:id="rId29"/>
+    <p:sldId id="328" r:id="rId30"/>
   </p:sldIdLst>
   <p:sldSz cx="12192000" cy="6858000"/>
   <p:notesSz cx="6858000" cy="9144000"/>
   <p:custDataLst>
-    <p:tags r:id="rId39"/>
+    <p:tags r:id="rId32"/>
   </p:custDataLst>
   <p:defaultTextStyle>
     <a:defPPr>
@@ -237,7 +230,7 @@
           </a:lstStyle>
           <a:p>
             <a:fld id="{4709199A-F3B5-4C4F-9552-F2F19F67FEBC}" type="datetimeFigureOut">
-              <a:t>1/28/22</a:t>
+              <a:t>2/1/22</a:t>
             </a:fld>
             <a:endParaRPr/>
           </a:p>
@@ -1325,7 +1318,7 @@
           <a:p>
             <a:fld id="{6101C5E1-D8E9-464D-A93E-CE21651935A7}" type="slidenum">
               <a:rPr lang="en-US" smtClean="0"/>
-              <a:t>15</a:t>
+              <a:t>16</a:t>
             </a:fld>
             <a:endParaRPr lang="en-US"/>
           </a:p>
@@ -1366,7 +1359,12 @@
             <p:ph type="sldImg"/>
           </p:nvPr>
         </p:nvSpPr>
-        <p:spPr/>
+        <p:spPr>
+          <a:xfrm>
+            <a:off x="685800" y="1143000"/>
+            <a:ext cx="5486400" cy="3086100"/>
+          </a:xfrm>
+        </p:spPr>
       </p:sp>
       <p:sp>
         <p:nvSpPr>
@@ -1408,7 +1406,7 @@
           <a:p>
             <a:fld id="{6101C5E1-D8E9-464D-A93E-CE21651935A7}" type="slidenum">
               <a:rPr lang="en-US" smtClean="0"/>
-              <a:t>16</a:t>
+              <a:t>17</a:t>
             </a:fld>
             <a:endParaRPr lang="en-US"/>
           </a:p>
@@ -1449,7 +1447,12 @@
             <p:ph type="sldImg"/>
           </p:nvPr>
         </p:nvSpPr>
-        <p:spPr/>
+        <p:spPr>
+          <a:xfrm>
+            <a:off x="685800" y="1143000"/>
+            <a:ext cx="5486400" cy="3086100"/>
+          </a:xfrm>
+        </p:spPr>
       </p:sp>
       <p:sp>
         <p:nvSpPr>
@@ -1491,7 +1494,7 @@
           <a:p>
             <a:fld id="{6101C5E1-D8E9-464D-A93E-CE21651935A7}" type="slidenum">
               <a:rPr lang="en-US" smtClean="0"/>
-              <a:t>17</a:t>
+              <a:t>18</a:t>
             </a:fld>
             <a:endParaRPr lang="en-US"/>
           </a:p>
@@ -1532,7 +1535,12 @@
             <p:ph type="sldImg"/>
           </p:nvPr>
         </p:nvSpPr>
-        <p:spPr/>
+        <p:spPr>
+          <a:xfrm>
+            <a:off x="685800" y="1143000"/>
+            <a:ext cx="5486400" cy="3086100"/>
+          </a:xfrm>
+        </p:spPr>
       </p:sp>
       <p:sp>
         <p:nvSpPr>
@@ -1574,7 +1582,7 @@
           <a:p>
             <a:fld id="{6101C5E1-D8E9-464D-A93E-CE21651935A7}" type="slidenum">
               <a:rPr lang="en-US" smtClean="0"/>
-              <a:t>18</a:t>
+              <a:t>19</a:t>
             </a:fld>
             <a:endParaRPr lang="en-US"/>
           </a:p>
@@ -1615,7 +1623,12 @@
             <p:ph type="sldImg"/>
           </p:nvPr>
         </p:nvSpPr>
-        <p:spPr/>
+        <p:spPr>
+          <a:xfrm>
+            <a:off x="685800" y="1143000"/>
+            <a:ext cx="5486400" cy="3086100"/>
+          </a:xfrm>
+        </p:spPr>
       </p:sp>
       <p:sp>
         <p:nvSpPr>
@@ -1657,7 +1670,7 @@
           <a:p>
             <a:fld id="{6101C5E1-D8E9-464D-A93E-CE21651935A7}" type="slidenum">
               <a:rPr lang="en-US" smtClean="0"/>
-              <a:t>19</a:t>
+              <a:t>20</a:t>
             </a:fld>
             <a:endParaRPr lang="en-US"/>
           </a:p>
@@ -1698,7 +1711,12 @@
             <p:ph type="sldImg"/>
           </p:nvPr>
         </p:nvSpPr>
-        <p:spPr/>
+        <p:spPr>
+          <a:xfrm>
+            <a:off x="685800" y="1143000"/>
+            <a:ext cx="5486400" cy="3086100"/>
+          </a:xfrm>
+        </p:spPr>
       </p:sp>
       <p:sp>
         <p:nvSpPr>
@@ -1740,7 +1758,7 @@
           <a:p>
             <a:fld id="{6101C5E1-D8E9-464D-A93E-CE21651935A7}" type="slidenum">
               <a:rPr lang="en-US" smtClean="0"/>
-              <a:t>20</a:t>
+              <a:t>21</a:t>
             </a:fld>
             <a:endParaRPr lang="en-US"/>
           </a:p>
@@ -1862,7 +1880,12 @@
             <p:ph type="sldImg"/>
           </p:nvPr>
         </p:nvSpPr>
-        <p:spPr/>
+        <p:spPr>
+          <a:xfrm>
+            <a:off x="685800" y="1143000"/>
+            <a:ext cx="5486400" cy="3086100"/>
+          </a:xfrm>
+        </p:spPr>
       </p:sp>
       <p:sp>
         <p:nvSpPr>
@@ -1904,7 +1927,7 @@
           <a:p>
             <a:fld id="{6101C5E1-D8E9-464D-A93E-CE21651935A7}" type="slidenum">
               <a:rPr lang="en-US" smtClean="0"/>
-              <a:t>21</a:t>
+              <a:t>22</a:t>
             </a:fld>
             <a:endParaRPr lang="en-US"/>
           </a:p>
@@ -1945,12 +1968,7 @@
             <p:ph type="sldImg"/>
           </p:nvPr>
         </p:nvSpPr>
-        <p:spPr>
-          <a:xfrm>
-            <a:off x="685800" y="1143000"/>
-            <a:ext cx="5486400" cy="3086100"/>
-          </a:xfrm>
-        </p:spPr>
+        <p:spPr/>
       </p:sp>
       <p:sp>
         <p:nvSpPr>
@@ -2031,7 +2049,12 @@
             <p:ph type="sldImg"/>
           </p:nvPr>
         </p:nvSpPr>
-        <p:spPr/>
+        <p:spPr>
+          <a:xfrm>
+            <a:off x="685800" y="1143000"/>
+            <a:ext cx="5486400" cy="3086100"/>
+          </a:xfrm>
+        </p:spPr>
       </p:sp>
       <p:sp>
         <p:nvSpPr>
@@ -2046,12 +2069,133 @@
         <p:spPr/>
         <p:txBody>
           <a:bodyPr>
-            <a:normAutofit/>
+            <a:normAutofit fontScale="85000" lnSpcReduction="20000"/>
           </a:bodyPr>
           <a:lstStyle/>
           <a:p>
-            <a:r>
-              <a:t>Explanation: Existing issues with the project are listed here. They're also labeled according to help needed.</a:t>
+            <a:pPr>
+              <a:spcBef>
+                <a:spcPct val="43750"/>
+              </a:spcBef>
+              <a:spcAft>
+                <a:spcPct val="43750"/>
+              </a:spcAft>
+            </a:pPr>
+            <a:r>
+              <a:t>In this module, you learned about the key features of GitHub, including issues, commits, and pull requests. You also used GitHub Pages to publish a public site based on the contents of your project.</a:t>
+            </a:r>
+          </a:p>
+          <a:p>
+            <a:endParaRPr/>
+          </a:p>
+          <a:p>
+            <a:pPr>
+              <a:spcBef>
+                <a:spcPct val="43750"/>
+              </a:spcBef>
+              <a:spcAft>
+                <a:spcPct val="43750"/>
+              </a:spcAft>
+            </a:pPr>
+            <a:r>
+              <a:t>You learned about:</a:t>
+            </a:r>
+          </a:p>
+          <a:p>
+            <a:endParaRPr/>
+          </a:p>
+          <a:p>
+            <a:r>
+              <a:t>Communicating with the project community in issues</a:t>
+            </a:r>
+          </a:p>
+          <a:p>
+            <a:endParaRPr/>
+          </a:p>
+          <a:p>
+            <a:r>
+              <a:t>Managing notifications for project events</a:t>
+            </a:r>
+          </a:p>
+          <a:p>
+            <a:endParaRPr/>
+          </a:p>
+          <a:p>
+            <a:r>
+              <a:t>Creating branches to manage work in parallel</a:t>
+            </a:r>
+          </a:p>
+          <a:p>
+            <a:endParaRPr/>
+          </a:p>
+          <a:p>
+            <a:r>
+              <a:t>Making commits to update project source</a:t>
+            </a:r>
+          </a:p>
+          <a:p>
+            <a:endParaRPr/>
+          </a:p>
+          <a:p>
+            <a:r>
+              <a:t>Introducing changes with pull requests</a:t>
+            </a:r>
+          </a:p>
+          <a:p>
+            <a:endParaRPr/>
+          </a:p>
+          <a:p>
+            <a:r>
+              <a:t>Deploying a web page to GitHub Pages</a:t>
+            </a:r>
+          </a:p>
+          <a:p>
+            <a:endParaRPr/>
+          </a:p>
+          <a:p>
+            <a:r>
+              <a:t>Differences between Git and GitHub and the roles they play in the software development lifecycle</a:t>
+            </a:r>
+          </a:p>
+          <a:p>
+            <a:endParaRPr/>
+          </a:p>
+          <a:p>
+            <a:r>
+              <a:t>How a repository fork differs from a clone</a:t>
+            </a:r>
+          </a:p>
+          <a:p>
+            <a:endParaRPr/>
+          </a:p>
+          <a:p>
+            <a:r>
+              <a:t>Repository labels and where to apply them in issues and pull requests</a:t>
+            </a:r>
+          </a:p>
+          <a:p>
+            <a:endParaRPr/>
+          </a:p>
+          <a:p>
+            <a:pPr>
+              <a:spcBef>
+                <a:spcPct val="43750"/>
+              </a:spcBef>
+              <a:spcAft>
+                <a:spcPct val="43750"/>
+              </a:spcAft>
+            </a:pPr>
+            <a:r>
+              <a:t>Now that you're familiar with the basics of GitHub, learn to </a:t>
+            </a:r>
+            <a:r>
+              <a:rPr>
+                <a:hlinkClick r:id="rId3"/>
+              </a:rPr>
+              <a:t>Upload your project by using GitHub best practices</a:t>
+            </a:r>
+            <a:r>
+              <a:t>.</a:t>
             </a:r>
           </a:p>
         </p:txBody>
@@ -2133,507 +2277,6 @@
           </a:bodyPr>
           <a:lstStyle/>
           <a:p>
-            <a:r>
-              <a:t>Explanation: Existing issues with the project are listed here. They're also labeled according to help needed.</a:t>
-            </a:r>
-          </a:p>
-        </p:txBody>
-      </p:sp>
-      <p:sp>
-        <p:nvSpPr>
-          <p:cNvPr id="4" name="Slide Number Placeholder 3"/>
-          <p:cNvSpPr>
-            <a:spLocks noGrp="1"/>
-          </p:cNvSpPr>
-          <p:nvPr>
-            <p:ph type="sldNum" sz="quarter" idx="10"/>
-          </p:nvPr>
-        </p:nvSpPr>
-        <p:spPr/>
-        <p:txBody>
-          <a:bodyPr/>
-          <a:lstStyle/>
-          <a:p>
-            <a:fld id="{6101C5E1-D8E9-464D-A93E-CE21651935A7}" type="slidenum">
-              <a:rPr lang="en-US" smtClean="0"/>
-              <a:t>25</a:t>
-            </a:fld>
-            <a:endParaRPr lang="en-US"/>
-          </a:p>
-        </p:txBody>
-      </p:sp>
-    </p:spTree>
-  </p:cSld>
-  <p:clrMapOvr>
-    <a:masterClrMapping/>
-  </p:clrMapOvr>
-</p:notes>
-</file>
-
-<file path=ppt/notesSlides/notesSlide24.xml><?xml version="1.0" encoding="utf-8"?>
-<p:notes xmlns:a="http://schemas.openxmlformats.org/drawingml/2006/main" xmlns:r="http://schemas.openxmlformats.org/officeDocument/2006/relationships" xmlns:p="http://schemas.openxmlformats.org/presentationml/2006/main">
-  <p:cSld>
-    <p:spTree>
-      <p:nvGrpSpPr>
-        <p:cNvPr id="1" name=""/>
-        <p:cNvGrpSpPr/>
-        <p:nvPr/>
-      </p:nvGrpSpPr>
-      <p:grpSpPr>
-        <a:xfrm>
-          <a:off x="0" y="0"/>
-          <a:ext cx="0" cy="0"/>
-          <a:chOff x="0" y="0"/>
-          <a:chExt cx="0" cy="0"/>
-        </a:xfrm>
-      </p:grpSpPr>
-      <p:sp>
-        <p:nvSpPr>
-          <p:cNvPr id="2" name="Slide Image Placeholder 1"/>
-          <p:cNvSpPr>
-            <a:spLocks noGrp="1" noRot="1" noChangeAspect="1"/>
-          </p:cNvSpPr>
-          <p:nvPr>
-            <p:ph type="sldImg"/>
-          </p:nvPr>
-        </p:nvSpPr>
-        <p:spPr/>
-      </p:sp>
-      <p:sp>
-        <p:nvSpPr>
-          <p:cNvPr id="3" name="Notes Placeholder 2"/>
-          <p:cNvSpPr>
-            <a:spLocks noGrp="1"/>
-          </p:cNvSpPr>
-          <p:nvPr>
-            <p:ph type="body" idx="1"/>
-          </p:nvPr>
-        </p:nvSpPr>
-        <p:spPr/>
-        <p:txBody>
-          <a:bodyPr>
-            <a:normAutofit/>
-          </a:bodyPr>
-          <a:lstStyle/>
-          <a:p>
-            <a:r>
-              <a:t>Explanation: You can either directly request a review or add a comment to your pull request to discuss anything about it.</a:t>
-            </a:r>
-          </a:p>
-        </p:txBody>
-      </p:sp>
-      <p:sp>
-        <p:nvSpPr>
-          <p:cNvPr id="4" name="Slide Number Placeholder 3"/>
-          <p:cNvSpPr>
-            <a:spLocks noGrp="1"/>
-          </p:cNvSpPr>
-          <p:nvPr>
-            <p:ph type="sldNum" sz="quarter" idx="10"/>
-          </p:nvPr>
-        </p:nvSpPr>
-        <p:spPr/>
-        <p:txBody>
-          <a:bodyPr/>
-          <a:lstStyle/>
-          <a:p>
-            <a:fld id="{6101C5E1-D8E9-464D-A93E-CE21651935A7}" type="slidenum">
-              <a:rPr lang="en-US" smtClean="0"/>
-              <a:t>26</a:t>
-            </a:fld>
-            <a:endParaRPr lang="en-US"/>
-          </a:p>
-        </p:txBody>
-      </p:sp>
-    </p:spTree>
-  </p:cSld>
-  <p:clrMapOvr>
-    <a:masterClrMapping/>
-  </p:clrMapOvr>
-</p:notes>
-</file>
-
-<file path=ppt/notesSlides/notesSlide25.xml><?xml version="1.0" encoding="utf-8"?>
-<p:notes xmlns:a="http://schemas.openxmlformats.org/drawingml/2006/main" xmlns:r="http://schemas.openxmlformats.org/officeDocument/2006/relationships" xmlns:p="http://schemas.openxmlformats.org/presentationml/2006/main">
-  <p:cSld>
-    <p:spTree>
-      <p:nvGrpSpPr>
-        <p:cNvPr id="1" name=""/>
-        <p:cNvGrpSpPr/>
-        <p:nvPr/>
-      </p:nvGrpSpPr>
-      <p:grpSpPr>
-        <a:xfrm>
-          <a:off x="0" y="0"/>
-          <a:ext cx="0" cy="0"/>
-          <a:chOff x="0" y="0"/>
-          <a:chExt cx="0" cy="0"/>
-        </a:xfrm>
-      </p:grpSpPr>
-      <p:sp>
-        <p:nvSpPr>
-          <p:cNvPr id="2" name="Slide Image Placeholder 1"/>
-          <p:cNvSpPr>
-            <a:spLocks noGrp="1" noRot="1" noChangeAspect="1"/>
-          </p:cNvSpPr>
-          <p:nvPr>
-            <p:ph type="sldImg"/>
-          </p:nvPr>
-        </p:nvSpPr>
-        <p:spPr/>
-      </p:sp>
-      <p:sp>
-        <p:nvSpPr>
-          <p:cNvPr id="3" name="Notes Placeholder 2"/>
-          <p:cNvSpPr>
-            <a:spLocks noGrp="1"/>
-          </p:cNvSpPr>
-          <p:nvPr>
-            <p:ph type="body" idx="1"/>
-          </p:nvPr>
-        </p:nvSpPr>
-        <p:spPr/>
-        <p:txBody>
-          <a:bodyPr>
-            <a:normAutofit/>
-          </a:bodyPr>
-          <a:lstStyle/>
-          <a:p>
-            <a:r>
-              <a:t>Explanation: You can either directly request a review or add a comment to your pull request to discuss anything about it.</a:t>
-            </a:r>
-          </a:p>
-        </p:txBody>
-      </p:sp>
-      <p:sp>
-        <p:nvSpPr>
-          <p:cNvPr id="4" name="Slide Number Placeholder 3"/>
-          <p:cNvSpPr>
-            <a:spLocks noGrp="1"/>
-          </p:cNvSpPr>
-          <p:nvPr>
-            <p:ph type="sldNum" sz="quarter" idx="10"/>
-          </p:nvPr>
-        </p:nvSpPr>
-        <p:spPr/>
-        <p:txBody>
-          <a:bodyPr/>
-          <a:lstStyle/>
-          <a:p>
-            <a:fld id="{6101C5E1-D8E9-464D-A93E-CE21651935A7}" type="slidenum">
-              <a:rPr lang="en-US" smtClean="0"/>
-              <a:t>27</a:t>
-            </a:fld>
-            <a:endParaRPr lang="en-US"/>
-          </a:p>
-        </p:txBody>
-      </p:sp>
-    </p:spTree>
-  </p:cSld>
-  <p:clrMapOvr>
-    <a:masterClrMapping/>
-  </p:clrMapOvr>
-</p:notes>
-</file>
-
-<file path=ppt/notesSlides/notesSlide26.xml><?xml version="1.0" encoding="utf-8"?>
-<p:notes xmlns:a="http://schemas.openxmlformats.org/drawingml/2006/main" xmlns:r="http://schemas.openxmlformats.org/officeDocument/2006/relationships" xmlns:p="http://schemas.openxmlformats.org/presentationml/2006/main">
-  <p:cSld>
-    <p:spTree>
-      <p:nvGrpSpPr>
-        <p:cNvPr id="1" name=""/>
-        <p:cNvGrpSpPr/>
-        <p:nvPr/>
-      </p:nvGrpSpPr>
-      <p:grpSpPr>
-        <a:xfrm>
-          <a:off x="0" y="0"/>
-          <a:ext cx="0" cy="0"/>
-          <a:chOff x="0" y="0"/>
-          <a:chExt cx="0" cy="0"/>
-        </a:xfrm>
-      </p:grpSpPr>
-      <p:sp>
-        <p:nvSpPr>
-          <p:cNvPr id="2" name="Slide Image Placeholder 1"/>
-          <p:cNvSpPr>
-            <a:spLocks noGrp="1" noRot="1" noChangeAspect="1"/>
-          </p:cNvSpPr>
-          <p:nvPr>
-            <p:ph type="sldImg"/>
-          </p:nvPr>
-        </p:nvSpPr>
-        <p:spPr/>
-      </p:sp>
-      <p:sp>
-        <p:nvSpPr>
-          <p:cNvPr id="3" name="Notes Placeholder 2"/>
-          <p:cNvSpPr>
-            <a:spLocks noGrp="1"/>
-          </p:cNvSpPr>
-          <p:nvPr>
-            <p:ph type="body" idx="1"/>
-          </p:nvPr>
-        </p:nvSpPr>
-        <p:spPr/>
-        <p:txBody>
-          <a:bodyPr>
-            <a:normAutofit/>
-          </a:bodyPr>
-          <a:lstStyle/>
-          <a:p>
-            <a:r>
-              <a:t>Explanation: While you can clone any public GitHub repository, by default you don't have the right to push any modifications. Fork the repository to create your own copy first.</a:t>
-            </a:r>
-          </a:p>
-        </p:txBody>
-      </p:sp>
-      <p:sp>
-        <p:nvSpPr>
-          <p:cNvPr id="4" name="Slide Number Placeholder 3"/>
-          <p:cNvSpPr>
-            <a:spLocks noGrp="1"/>
-          </p:cNvSpPr>
-          <p:nvPr>
-            <p:ph type="sldNum" sz="quarter" idx="10"/>
-          </p:nvPr>
-        </p:nvSpPr>
-        <p:spPr/>
-        <p:txBody>
-          <a:bodyPr/>
-          <a:lstStyle/>
-          <a:p>
-            <a:fld id="{6101C5E1-D8E9-464D-A93E-CE21651935A7}" type="slidenum">
-              <a:rPr lang="en-US" smtClean="0"/>
-              <a:t>28</a:t>
-            </a:fld>
-            <a:endParaRPr lang="en-US"/>
-          </a:p>
-        </p:txBody>
-      </p:sp>
-    </p:spTree>
-  </p:cSld>
-  <p:clrMapOvr>
-    <a:masterClrMapping/>
-  </p:clrMapOvr>
-</p:notes>
-</file>
-
-<file path=ppt/notesSlides/notesSlide27.xml><?xml version="1.0" encoding="utf-8"?>
-<p:notes xmlns:a="http://schemas.openxmlformats.org/drawingml/2006/main" xmlns:r="http://schemas.openxmlformats.org/officeDocument/2006/relationships" xmlns:p="http://schemas.openxmlformats.org/presentationml/2006/main">
-  <p:cSld>
-    <p:spTree>
-      <p:nvGrpSpPr>
-        <p:cNvPr id="1" name=""/>
-        <p:cNvGrpSpPr/>
-        <p:nvPr/>
-      </p:nvGrpSpPr>
-      <p:grpSpPr>
-        <a:xfrm>
-          <a:off x="0" y="0"/>
-          <a:ext cx="0" cy="0"/>
-          <a:chOff x="0" y="0"/>
-          <a:chExt cx="0" cy="0"/>
-        </a:xfrm>
-      </p:grpSpPr>
-      <p:sp>
-        <p:nvSpPr>
-          <p:cNvPr id="2" name="Slide Image Placeholder 1"/>
-          <p:cNvSpPr>
-            <a:spLocks noGrp="1" noRot="1" noChangeAspect="1"/>
-          </p:cNvSpPr>
-          <p:nvPr>
-            <p:ph type="sldImg"/>
-          </p:nvPr>
-        </p:nvSpPr>
-        <p:spPr/>
-      </p:sp>
-      <p:sp>
-        <p:nvSpPr>
-          <p:cNvPr id="3" name="Notes Placeholder 2"/>
-          <p:cNvSpPr>
-            <a:spLocks noGrp="1"/>
-          </p:cNvSpPr>
-          <p:nvPr>
-            <p:ph type="body" idx="1"/>
-          </p:nvPr>
-        </p:nvSpPr>
-        <p:spPr/>
-        <p:txBody>
-          <a:bodyPr>
-            <a:normAutofit/>
-          </a:bodyPr>
-          <a:lstStyle/>
-          <a:p>
-            <a:r>
-              <a:t>Explanation: While you can clone any public GitHub repository, by default you don't have the right to push any modifications. Fork the repository to create your own copy first.</a:t>
-            </a:r>
-          </a:p>
-        </p:txBody>
-      </p:sp>
-      <p:sp>
-        <p:nvSpPr>
-          <p:cNvPr id="4" name="Slide Number Placeholder 3"/>
-          <p:cNvSpPr>
-            <a:spLocks noGrp="1"/>
-          </p:cNvSpPr>
-          <p:nvPr>
-            <p:ph type="sldNum" sz="quarter" idx="10"/>
-          </p:nvPr>
-        </p:nvSpPr>
-        <p:spPr/>
-        <p:txBody>
-          <a:bodyPr/>
-          <a:lstStyle/>
-          <a:p>
-            <a:fld id="{6101C5E1-D8E9-464D-A93E-CE21651935A7}" type="slidenum">
-              <a:rPr lang="en-US" smtClean="0"/>
-              <a:t>29</a:t>
-            </a:fld>
-            <a:endParaRPr lang="en-US"/>
-          </a:p>
-        </p:txBody>
-      </p:sp>
-    </p:spTree>
-  </p:cSld>
-  <p:clrMapOvr>
-    <a:masterClrMapping/>
-  </p:clrMapOvr>
-</p:notes>
-</file>
-
-<file path=ppt/notesSlides/notesSlide28.xml><?xml version="1.0" encoding="utf-8"?>
-<p:notes xmlns:a="http://schemas.openxmlformats.org/drawingml/2006/main" xmlns:r="http://schemas.openxmlformats.org/officeDocument/2006/relationships" xmlns:p="http://schemas.openxmlformats.org/presentationml/2006/main">
-  <p:cSld>
-    <p:spTree>
-      <p:nvGrpSpPr>
-        <p:cNvPr id="1" name=""/>
-        <p:cNvGrpSpPr/>
-        <p:nvPr/>
-      </p:nvGrpSpPr>
-      <p:grpSpPr>
-        <a:xfrm>
-          <a:off x="0" y="0"/>
-          <a:ext cx="0" cy="0"/>
-          <a:chOff x="0" y="0"/>
-          <a:chExt cx="0" cy="0"/>
-        </a:xfrm>
-      </p:grpSpPr>
-      <p:sp>
-        <p:nvSpPr>
-          <p:cNvPr id="2" name="Slide Image Placeholder 1"/>
-          <p:cNvSpPr>
-            <a:spLocks noGrp="1" noRot="1" noChangeAspect="1"/>
-          </p:cNvSpPr>
-          <p:nvPr>
-            <p:ph type="sldImg"/>
-          </p:nvPr>
-        </p:nvSpPr>
-        <p:spPr/>
-      </p:sp>
-      <p:sp>
-        <p:nvSpPr>
-          <p:cNvPr id="3" name="Notes Placeholder 2"/>
-          <p:cNvSpPr>
-            <a:spLocks noGrp="1"/>
-          </p:cNvSpPr>
-          <p:nvPr>
-            <p:ph type="body" idx="1"/>
-          </p:nvPr>
-        </p:nvSpPr>
-        <p:spPr/>
-        <p:txBody>
-          <a:bodyPr>
-            <a:normAutofit/>
-          </a:bodyPr>
-          <a:lstStyle/>
-          <a:p>
-            <a:endParaRPr/>
-          </a:p>
-        </p:txBody>
-      </p:sp>
-      <p:sp>
-        <p:nvSpPr>
-          <p:cNvPr id="4" name="Slide Number Placeholder 3"/>
-          <p:cNvSpPr>
-            <a:spLocks noGrp="1"/>
-          </p:cNvSpPr>
-          <p:nvPr>
-            <p:ph type="sldNum" sz="quarter" idx="10"/>
-          </p:nvPr>
-        </p:nvSpPr>
-        <p:spPr/>
-        <p:txBody>
-          <a:bodyPr/>
-          <a:lstStyle/>
-          <a:p>
-            <a:fld id="{6101C5E1-D8E9-464D-A93E-CE21651935A7}" type="slidenum">
-              <a:rPr lang="en-US" smtClean="0"/>
-              <a:t>30</a:t>
-            </a:fld>
-            <a:endParaRPr lang="en-US"/>
-          </a:p>
-        </p:txBody>
-      </p:sp>
-    </p:spTree>
-  </p:cSld>
-  <p:clrMapOvr>
-    <a:masterClrMapping/>
-  </p:clrMapOvr>
-</p:notes>
-</file>
-
-<file path=ppt/notesSlides/notesSlide29.xml><?xml version="1.0" encoding="utf-8"?>
-<p:notes xmlns:a="http://schemas.openxmlformats.org/drawingml/2006/main" xmlns:r="http://schemas.openxmlformats.org/officeDocument/2006/relationships" xmlns:p="http://schemas.openxmlformats.org/presentationml/2006/main">
-  <p:cSld>
-    <p:spTree>
-      <p:nvGrpSpPr>
-        <p:cNvPr id="1" name=""/>
-        <p:cNvGrpSpPr/>
-        <p:nvPr/>
-      </p:nvGrpSpPr>
-      <p:grpSpPr>
-        <a:xfrm>
-          <a:off x="0" y="0"/>
-          <a:ext cx="0" cy="0"/>
-          <a:chOff x="0" y="0"/>
-          <a:chExt cx="0" cy="0"/>
-        </a:xfrm>
-      </p:grpSpPr>
-      <p:sp>
-        <p:nvSpPr>
-          <p:cNvPr id="2" name="Slide Image Placeholder 1"/>
-          <p:cNvSpPr>
-            <a:spLocks noGrp="1" noRot="1" noChangeAspect="1"/>
-          </p:cNvSpPr>
-          <p:nvPr>
-            <p:ph type="sldImg"/>
-          </p:nvPr>
-        </p:nvSpPr>
-        <p:spPr>
-          <a:xfrm>
-            <a:off x="685800" y="1143000"/>
-            <a:ext cx="5486400" cy="3086100"/>
-          </a:xfrm>
-        </p:spPr>
-      </p:sp>
-      <p:sp>
-        <p:nvSpPr>
-          <p:cNvPr id="3" name="Notes Placeholder 2"/>
-          <p:cNvSpPr>
-            <a:spLocks noGrp="1"/>
-          </p:cNvSpPr>
-          <p:nvPr>
-            <p:ph type="body" idx="1"/>
-          </p:nvPr>
-        </p:nvSpPr>
-        <p:spPr/>
-        <p:txBody>
-          <a:bodyPr>
-            <a:normAutofit fontScale="85000" lnSpcReduction="20000"/>
-          </a:bodyPr>
-          <a:lstStyle/>
-          <a:p>
             <a:pPr>
               <a:spcBef>
                 <a:spcPct val="43750"/>
@@ -2643,120 +2286,96 @@
               </a:spcAft>
             </a:pPr>
             <a:r>
-              <a:t>In this module, you learned about the key features of GitHub, including issues, commits, and pull requests. You also used GitHub Pages to publish a public site based on the contents of your project.</a:t>
+              <a:t>Here are some links to more information on the topics we discussed in this module.</a:t>
             </a:r>
           </a:p>
           <a:p>
             <a:endParaRPr/>
           </a:p>
           <a:p>
-            <a:pPr>
-              <a:spcBef>
-                <a:spcPct val="43750"/>
-              </a:spcBef>
-              <a:spcAft>
-                <a:spcPct val="43750"/>
-              </a:spcAft>
-            </a:pPr>
-            <a:r>
-              <a:t>You learned about:</a:t>
-            </a:r>
-          </a:p>
-          <a:p>
-            <a:endParaRPr/>
-          </a:p>
-          <a:p>
-            <a:r>
-              <a:t>Communicating with the project community in issues</a:t>
-            </a:r>
-          </a:p>
-          <a:p>
-            <a:endParaRPr/>
-          </a:p>
-          <a:p>
-            <a:r>
-              <a:t>Managing notifications for project events</a:t>
-            </a:r>
-          </a:p>
-          <a:p>
-            <a:endParaRPr/>
-          </a:p>
-          <a:p>
-            <a:r>
-              <a:t>Creating branches to manage work in parallel</a:t>
-            </a:r>
-          </a:p>
-          <a:p>
-            <a:endParaRPr/>
-          </a:p>
-          <a:p>
-            <a:r>
-              <a:t>Making commits to update project source</a:t>
-            </a:r>
-          </a:p>
-          <a:p>
-            <a:endParaRPr/>
-          </a:p>
-          <a:p>
-            <a:r>
-              <a:t>Introducing changes with pull requests</a:t>
-            </a:r>
-          </a:p>
-          <a:p>
-            <a:endParaRPr/>
-          </a:p>
-          <a:p>
-            <a:r>
-              <a:t>Deploying a web page to GitHub Pages</a:t>
-            </a:r>
-          </a:p>
-          <a:p>
-            <a:endParaRPr/>
-          </a:p>
-          <a:p>
-            <a:r>
-              <a:t>Differences between Git and GitHub and the roles they play in the software development lifecycle</a:t>
-            </a:r>
-          </a:p>
-          <a:p>
-            <a:endParaRPr/>
-          </a:p>
-          <a:p>
-            <a:r>
-              <a:t>How a repository fork differs from a clone</a:t>
-            </a:r>
-          </a:p>
-          <a:p>
-            <a:endParaRPr/>
-          </a:p>
-          <a:p>
-            <a:r>
-              <a:t>Repository labels and where to apply them in issues and pull requests</a:t>
-            </a:r>
-          </a:p>
-          <a:p>
-            <a:endParaRPr/>
-          </a:p>
-          <a:p>
-            <a:pPr>
-              <a:spcBef>
-                <a:spcPct val="43750"/>
-              </a:spcBef>
-              <a:spcAft>
-                <a:spcPct val="43750"/>
-              </a:spcAft>
-            </a:pPr>
-            <a:r>
-              <a:t>Now that you're familiar with the basics of GitHub, learn to </a:t>
-            </a:r>
             <a:r>
               <a:rPr>
                 <a:hlinkClick r:id="rId3"/>
               </a:rPr>
-              <a:t>Upload your project by using GitHub best practices</a:t>
-            </a:r>
-            <a:r>
-              <a:t>.</a:t>
+              <a:t>Setting up and managing organizations and teams</a:t>
+            </a:r>
+          </a:p>
+          <a:p>
+            <a:endParaRPr>
+              <a:hlinkClick r:id="rId3"/>
+            </a:endParaRPr>
+          </a:p>
+          <a:p>
+            <a:r>
+              <a:rPr>
+                <a:hlinkClick r:id="rId4"/>
+              </a:rPr>
+              <a:t>Committing changes to your project</a:t>
+            </a:r>
+          </a:p>
+          <a:p>
+            <a:endParaRPr>
+              <a:hlinkClick r:id="rId4"/>
+            </a:endParaRPr>
+          </a:p>
+          <a:p>
+            <a:r>
+              <a:rPr>
+                <a:hlinkClick r:id="rId5"/>
+              </a:rPr>
+              <a:t>Collaborating with issues and pull requests</a:t>
+            </a:r>
+          </a:p>
+          <a:p>
+            <a:endParaRPr>
+              <a:hlinkClick r:id="rId5"/>
+            </a:endParaRPr>
+          </a:p>
+          <a:p>
+            <a:r>
+              <a:rPr>
+                <a:hlinkClick r:id="rId6"/>
+              </a:rPr>
+              <a:t>About the role of labels</a:t>
+            </a:r>
+          </a:p>
+          <a:p>
+            <a:endParaRPr>
+              <a:hlinkClick r:id="rId6"/>
+            </a:endParaRPr>
+          </a:p>
+          <a:p>
+            <a:r>
+              <a:rPr>
+                <a:hlinkClick r:id="rId7"/>
+              </a:rPr>
+              <a:t>GitHub Actions</a:t>
+            </a:r>
+          </a:p>
+          <a:p>
+            <a:endParaRPr>
+              <a:hlinkClick r:id="rId7"/>
+            </a:endParaRPr>
+          </a:p>
+          <a:p>
+            <a:r>
+              <a:rPr>
+                <a:hlinkClick r:id="rId8"/>
+              </a:rPr>
+              <a:t>Fork a repo</a:t>
+            </a:r>
+          </a:p>
+          <a:p>
+            <a:endParaRPr>
+              <a:hlinkClick r:id="rId8"/>
+            </a:endParaRPr>
+          </a:p>
+          <a:p>
+            <a:r>
+              <a:rPr>
+                <a:hlinkClick r:id="rId9"/>
+              </a:rPr>
+              <a:t>Working with GitHub Pages</a:t>
             </a:r>
           </a:p>
         </p:txBody>
@@ -2778,7 +2397,7 @@
           <a:p>
             <a:fld id="{6101C5E1-D8E9-464D-A93E-CE21651935A7}" type="slidenum">
               <a:rPr lang="en-US" smtClean="0"/>
-              <a:t>31</a:t>
+              <a:t>25</a:t>
             </a:fld>
             <a:endParaRPr lang="en-US"/>
           </a:p>
@@ -2878,186 +2497,6 @@
 </p:notes>
 </file>
 
-<file path=ppt/notesSlides/notesSlide30.xml><?xml version="1.0" encoding="utf-8"?>
-<p:notes xmlns:a="http://schemas.openxmlformats.org/drawingml/2006/main" xmlns:r="http://schemas.openxmlformats.org/officeDocument/2006/relationships" xmlns:p="http://schemas.openxmlformats.org/presentationml/2006/main">
-  <p:cSld>
-    <p:spTree>
-      <p:nvGrpSpPr>
-        <p:cNvPr id="1" name=""/>
-        <p:cNvGrpSpPr/>
-        <p:nvPr/>
-      </p:nvGrpSpPr>
-      <p:grpSpPr>
-        <a:xfrm>
-          <a:off x="0" y="0"/>
-          <a:ext cx="0" cy="0"/>
-          <a:chOff x="0" y="0"/>
-          <a:chExt cx="0" cy="0"/>
-        </a:xfrm>
-      </p:grpSpPr>
-      <p:sp>
-        <p:nvSpPr>
-          <p:cNvPr id="2" name="Slide Image Placeholder 1"/>
-          <p:cNvSpPr>
-            <a:spLocks noGrp="1" noRot="1" noChangeAspect="1"/>
-          </p:cNvSpPr>
-          <p:nvPr>
-            <p:ph type="sldImg"/>
-          </p:nvPr>
-        </p:nvSpPr>
-        <p:spPr/>
-      </p:sp>
-      <p:sp>
-        <p:nvSpPr>
-          <p:cNvPr id="3" name="Notes Placeholder 2"/>
-          <p:cNvSpPr>
-            <a:spLocks noGrp="1"/>
-          </p:cNvSpPr>
-          <p:nvPr>
-            <p:ph type="body" idx="1"/>
-          </p:nvPr>
-        </p:nvSpPr>
-        <p:spPr/>
-        <p:txBody>
-          <a:bodyPr>
-            <a:normAutofit/>
-          </a:bodyPr>
-          <a:lstStyle/>
-          <a:p>
-            <a:pPr>
-              <a:spcBef>
-                <a:spcPct val="43750"/>
-              </a:spcBef>
-              <a:spcAft>
-                <a:spcPct val="43750"/>
-              </a:spcAft>
-            </a:pPr>
-            <a:r>
-              <a:t>Here are some links to more information on the topics we discussed in this module.</a:t>
-            </a:r>
-          </a:p>
-          <a:p>
-            <a:endParaRPr/>
-          </a:p>
-          <a:p>
-            <a:r>
-              <a:rPr>
-                <a:hlinkClick r:id="rId3"/>
-              </a:rPr>
-              <a:t>Setting up and managing organizations and teams</a:t>
-            </a:r>
-          </a:p>
-          <a:p>
-            <a:endParaRPr>
-              <a:hlinkClick r:id="rId3"/>
-            </a:endParaRPr>
-          </a:p>
-          <a:p>
-            <a:r>
-              <a:rPr>
-                <a:hlinkClick r:id="rId4"/>
-              </a:rPr>
-              <a:t>Committing changes to your project</a:t>
-            </a:r>
-          </a:p>
-          <a:p>
-            <a:endParaRPr>
-              <a:hlinkClick r:id="rId4"/>
-            </a:endParaRPr>
-          </a:p>
-          <a:p>
-            <a:r>
-              <a:rPr>
-                <a:hlinkClick r:id="rId5"/>
-              </a:rPr>
-              <a:t>Collaborating with issues and pull requests</a:t>
-            </a:r>
-          </a:p>
-          <a:p>
-            <a:endParaRPr>
-              <a:hlinkClick r:id="rId5"/>
-            </a:endParaRPr>
-          </a:p>
-          <a:p>
-            <a:r>
-              <a:rPr>
-                <a:hlinkClick r:id="rId6"/>
-              </a:rPr>
-              <a:t>About the role of labels</a:t>
-            </a:r>
-          </a:p>
-          <a:p>
-            <a:endParaRPr>
-              <a:hlinkClick r:id="rId6"/>
-            </a:endParaRPr>
-          </a:p>
-          <a:p>
-            <a:r>
-              <a:rPr>
-                <a:hlinkClick r:id="rId7"/>
-              </a:rPr>
-              <a:t>GitHub Actions</a:t>
-            </a:r>
-          </a:p>
-          <a:p>
-            <a:endParaRPr>
-              <a:hlinkClick r:id="rId7"/>
-            </a:endParaRPr>
-          </a:p>
-          <a:p>
-            <a:r>
-              <a:rPr>
-                <a:hlinkClick r:id="rId8"/>
-              </a:rPr>
-              <a:t>Fork a repo</a:t>
-            </a:r>
-          </a:p>
-          <a:p>
-            <a:endParaRPr>
-              <a:hlinkClick r:id="rId8"/>
-            </a:endParaRPr>
-          </a:p>
-          <a:p>
-            <a:r>
-              <a:rPr>
-                <a:hlinkClick r:id="rId9"/>
-              </a:rPr>
-              <a:t>Working with GitHub Pages</a:t>
-            </a:r>
-          </a:p>
-        </p:txBody>
-      </p:sp>
-      <p:sp>
-        <p:nvSpPr>
-          <p:cNvPr id="4" name="Slide Number Placeholder 3"/>
-          <p:cNvSpPr>
-            <a:spLocks noGrp="1"/>
-          </p:cNvSpPr>
-          <p:nvPr>
-            <p:ph type="sldNum" sz="quarter" idx="10"/>
-          </p:nvPr>
-        </p:nvSpPr>
-        <p:spPr/>
-        <p:txBody>
-          <a:bodyPr/>
-          <a:lstStyle/>
-          <a:p>
-            <a:fld id="{6101C5E1-D8E9-464D-A93E-CE21651935A7}" type="slidenum">
-              <a:rPr lang="en-US" smtClean="0"/>
-              <a:t>32</a:t>
-            </a:fld>
-            <a:endParaRPr lang="en-US"/>
-          </a:p>
-        </p:txBody>
-      </p:sp>
-    </p:spTree>
-  </p:cSld>
-  <p:clrMapOvr>
-    <a:masterClrMapping/>
-  </p:clrMapOvr>
-</p:notes>
-</file>
-
 <file path=ppt/notesSlides/notesSlide4.xml><?xml version="1.0" encoding="utf-8"?>
 <p:notes xmlns:a="http://schemas.openxmlformats.org/drawingml/2006/main" xmlns:r="http://schemas.openxmlformats.org/officeDocument/2006/relationships" xmlns:p="http://schemas.openxmlformats.org/presentationml/2006/main">
   <p:cSld>
@@ -4018,7 +3457,7 @@
           <a:p>
             <a:fld id="{B6A44C1F-B052-494F-9239-BAE423CFA476}" type="datetimeFigureOut">
               <a:rPr lang="en-US" smtClean="0"/>
-              <a:t>1/28/22</a:t>
+              <a:t>2/1/22</a:t>
             </a:fld>
             <a:endParaRPr lang="en-US"/>
           </a:p>
@@ -4181,7 +3620,7 @@
           <a:p>
             <a:fld id="{76407003-769C-4EB1-9214-0A152FB528D3}" type="datetimeFigureOut">
               <a:rPr lang="en-US" smtClean="0"/>
-              <a:t>1/28/22</a:t>
+              <a:t>2/1/22</a:t>
             </a:fld>
             <a:endParaRPr lang="en-US"/>
           </a:p>
@@ -4897,7 +4336,7 @@
         <p:fade/>
       </p:transition>
     </mc:Choice>
-    <mc:Fallback xmlns:p159="http://schemas.microsoft.com/office/powerpoint/2015/09/main" xmlns:p15="http://schemas.microsoft.com/office/powerpoint/2012/main" xmlns:a14="http://schemas.microsoft.com/office/drawing/2010/main" xmlns:wp="http://schemas.openxmlformats.org/drawingml/2006/wordprocessingDrawing" xmlns:w="http://schemas.openxmlformats.org/wordprocessingml/2006/main" xmlns:m="http://schemas.openxmlformats.org/officeDocument/2006/math" xmlns="">
+    <mc:Fallback xmlns="" xmlns:m="http://schemas.openxmlformats.org/officeDocument/2006/math" xmlns:w="http://schemas.openxmlformats.org/wordprocessingml/2006/main" xmlns:wp="http://schemas.openxmlformats.org/drawingml/2006/wordprocessingDrawing" xmlns:a14="http://schemas.microsoft.com/office/drawing/2010/main" xmlns:p15="http://schemas.microsoft.com/office/powerpoint/2012/main" xmlns:p159="http://schemas.microsoft.com/office/powerpoint/2015/09/main">
       <p:transition spd="med">
         <p:fade/>
       </p:transition>
@@ -5139,7 +4578,7 @@
         <p:fade/>
       </p:transition>
     </mc:Choice>
-    <mc:Fallback xmlns:p159="http://schemas.microsoft.com/office/powerpoint/2015/09/main" xmlns:p15="http://schemas.microsoft.com/office/powerpoint/2012/main" xmlns:a14="http://schemas.microsoft.com/office/drawing/2010/main" xmlns:wp="http://schemas.openxmlformats.org/drawingml/2006/wordprocessingDrawing" xmlns:w="http://schemas.openxmlformats.org/wordprocessingml/2006/main" xmlns:m="http://schemas.openxmlformats.org/officeDocument/2006/math" xmlns="">
+    <mc:Fallback xmlns="" xmlns:m="http://schemas.openxmlformats.org/officeDocument/2006/math" xmlns:w="http://schemas.openxmlformats.org/wordprocessingml/2006/main" xmlns:wp="http://schemas.openxmlformats.org/drawingml/2006/wordprocessingDrawing" xmlns:a14="http://schemas.microsoft.com/office/drawing/2010/main" xmlns:p15="http://schemas.microsoft.com/office/powerpoint/2012/main" xmlns:p159="http://schemas.microsoft.com/office/powerpoint/2015/09/main">
       <p:transition spd="med">
         <p:fade/>
       </p:transition>
@@ -7075,7 +6514,7 @@
           <a:p>
             <a:fld id="{611DDC36-9DF1-4635-99D4-5660C91865E3}" type="datetimeFigureOut">
               <a:rPr lang="en-US" smtClean="0"/>
-              <a:t>1/28/22</a:t>
+              <a:t>2/1/22</a:t>
             </a:fld>
             <a:endParaRPr lang="en-US"/>
           </a:p>
@@ -10157,7 +9596,7 @@
         <p:fade/>
       </p:transition>
     </mc:Choice>
-    <mc:Fallback xmlns:p159="http://schemas.microsoft.com/office/powerpoint/2015/09/main" xmlns:p15="http://schemas.microsoft.com/office/powerpoint/2012/main" xmlns:a14="http://schemas.microsoft.com/office/drawing/2010/main" xmlns:wp="http://schemas.openxmlformats.org/drawingml/2006/wordprocessingDrawing" xmlns:w="http://schemas.openxmlformats.org/wordprocessingml/2006/main" xmlns:m="http://schemas.openxmlformats.org/officeDocument/2006/math" xmlns="">
+    <mc:Fallback xmlns="" xmlns:m="http://schemas.openxmlformats.org/officeDocument/2006/math" xmlns:w="http://schemas.openxmlformats.org/wordprocessingml/2006/main" xmlns:wp="http://schemas.openxmlformats.org/drawingml/2006/wordprocessingDrawing" xmlns:a14="http://schemas.microsoft.com/office/drawing/2010/main" xmlns:p15="http://schemas.microsoft.com/office/powerpoint/2012/main" xmlns:p159="http://schemas.microsoft.com/office/powerpoint/2015/09/main">
       <p:transition spd="med">
         <p:fade/>
       </p:transition>
@@ -14180,7 +13619,7 @@
         <p:fade/>
       </p:transition>
     </mc:Choice>
-    <mc:Fallback xmlns:p159="http://schemas.microsoft.com/office/powerpoint/2015/09/main" xmlns:p15="http://schemas.microsoft.com/office/powerpoint/2012/main" xmlns:a14="http://schemas.microsoft.com/office/drawing/2010/main" xmlns:wp="http://schemas.openxmlformats.org/drawingml/2006/wordprocessingDrawing" xmlns:w="http://schemas.openxmlformats.org/wordprocessingml/2006/main" xmlns:m="http://schemas.openxmlformats.org/officeDocument/2006/math" xmlns="">
+    <mc:Fallback xmlns="" xmlns:m="http://schemas.openxmlformats.org/officeDocument/2006/math" xmlns:w="http://schemas.openxmlformats.org/wordprocessingml/2006/main" xmlns:wp="http://schemas.openxmlformats.org/drawingml/2006/wordprocessingDrawing" xmlns:a14="http://schemas.microsoft.com/office/drawing/2010/main" xmlns:p15="http://schemas.microsoft.com/office/powerpoint/2012/main" xmlns:p159="http://schemas.microsoft.com/office/powerpoint/2015/09/main">
       <p:transition spd="med">
         <p:fade/>
       </p:transition>
@@ -17018,7 +16457,7 @@
         <p:fade/>
       </p:transition>
     </mc:Choice>
-    <mc:Fallback xmlns:p159="http://schemas.microsoft.com/office/powerpoint/2015/09/main" xmlns:p15="http://schemas.microsoft.com/office/powerpoint/2012/main" xmlns:a14="http://schemas.microsoft.com/office/drawing/2010/main" xmlns:wp="http://schemas.openxmlformats.org/drawingml/2006/wordprocessingDrawing" xmlns:w="http://schemas.openxmlformats.org/wordprocessingml/2006/main" xmlns:m="http://schemas.openxmlformats.org/officeDocument/2006/math" xmlns="">
+    <mc:Fallback xmlns="" xmlns:m="http://schemas.openxmlformats.org/officeDocument/2006/math" xmlns:w="http://schemas.openxmlformats.org/wordprocessingml/2006/main" xmlns:wp="http://schemas.openxmlformats.org/drawingml/2006/wordprocessingDrawing" xmlns:a14="http://schemas.microsoft.com/office/drawing/2010/main" xmlns:p15="http://schemas.microsoft.com/office/powerpoint/2012/main" xmlns:p159="http://schemas.microsoft.com/office/powerpoint/2015/09/main">
       <p:transition spd="med">
         <p:fade/>
       </p:transition>
@@ -17209,7 +16648,7 @@
         <p:fade/>
       </p:transition>
     </mc:Choice>
-    <mc:Fallback xmlns:p159="http://schemas.microsoft.com/office/powerpoint/2015/09/main" xmlns:p15="http://schemas.microsoft.com/office/powerpoint/2012/main" xmlns:a14="http://schemas.microsoft.com/office/drawing/2010/main" xmlns:wp="http://schemas.openxmlformats.org/drawingml/2006/wordprocessingDrawing" xmlns:w="http://schemas.openxmlformats.org/wordprocessingml/2006/main" xmlns:m="http://schemas.openxmlformats.org/officeDocument/2006/math" xmlns="">
+    <mc:Fallback xmlns="" xmlns:m="http://schemas.openxmlformats.org/officeDocument/2006/math" xmlns:w="http://schemas.openxmlformats.org/wordprocessingml/2006/main" xmlns:wp="http://schemas.openxmlformats.org/drawingml/2006/wordprocessingDrawing" xmlns:a14="http://schemas.microsoft.com/office/drawing/2010/main" xmlns:p15="http://schemas.microsoft.com/office/powerpoint/2012/main" xmlns:p159="http://schemas.microsoft.com/office/powerpoint/2015/09/main">
       <p:transition spd="med">
         <p:fade/>
       </p:transition>
@@ -17324,7 +16763,7 @@
         <p:fade/>
       </p:transition>
     </mc:Choice>
-    <mc:Fallback xmlns:p159="http://schemas.microsoft.com/office/powerpoint/2015/09/main" xmlns:p15="http://schemas.microsoft.com/office/powerpoint/2012/main" xmlns:a14="http://schemas.microsoft.com/office/drawing/2010/main" xmlns:wp="http://schemas.openxmlformats.org/drawingml/2006/wordprocessingDrawing" xmlns:w="http://schemas.openxmlformats.org/wordprocessingml/2006/main" xmlns:m="http://schemas.openxmlformats.org/officeDocument/2006/math" xmlns="">
+    <mc:Fallback xmlns="" xmlns:m="http://schemas.openxmlformats.org/officeDocument/2006/math" xmlns:w="http://schemas.openxmlformats.org/wordprocessingml/2006/main" xmlns:wp="http://schemas.openxmlformats.org/drawingml/2006/wordprocessingDrawing" xmlns:a14="http://schemas.microsoft.com/office/drawing/2010/main" xmlns:p15="http://schemas.microsoft.com/office/powerpoint/2012/main" xmlns:p159="http://schemas.microsoft.com/office/powerpoint/2015/09/main">
       <p:transition spd="med">
         <p:fade/>
       </p:transition>
@@ -18969,7 +18408,7 @@
         <p:fade/>
       </p:transition>
     </mc:Choice>
-    <mc:Fallback xmlns:p159="http://schemas.microsoft.com/office/powerpoint/2015/09/main" xmlns:p15="http://schemas.microsoft.com/office/powerpoint/2012/main" xmlns:a14="http://schemas.microsoft.com/office/drawing/2010/main" xmlns:wp="http://schemas.openxmlformats.org/drawingml/2006/wordprocessingDrawing" xmlns:w="http://schemas.openxmlformats.org/wordprocessingml/2006/main" xmlns:m="http://schemas.openxmlformats.org/officeDocument/2006/math" xmlns="">
+    <mc:Fallback xmlns="" xmlns:m="http://schemas.openxmlformats.org/officeDocument/2006/math" xmlns:w="http://schemas.openxmlformats.org/wordprocessingml/2006/main" xmlns:wp="http://schemas.openxmlformats.org/drawingml/2006/wordprocessingDrawing" xmlns:a14="http://schemas.microsoft.com/office/drawing/2010/main" xmlns:p15="http://schemas.microsoft.com/office/powerpoint/2012/main" xmlns:p159="http://schemas.microsoft.com/office/powerpoint/2015/09/main">
       <p:transition spd="med">
         <p:fade/>
       </p:transition>
@@ -19187,7 +18626,7 @@
         <p:fade/>
       </p:transition>
     </mc:Choice>
-    <mc:Fallback xmlns:p159="http://schemas.microsoft.com/office/powerpoint/2015/09/main" xmlns:p15="http://schemas.microsoft.com/office/powerpoint/2012/main" xmlns:a14="http://schemas.microsoft.com/office/drawing/2010/main" xmlns:wp="http://schemas.openxmlformats.org/drawingml/2006/wordprocessingDrawing" xmlns:w="http://schemas.openxmlformats.org/wordprocessingml/2006/main" xmlns:m="http://schemas.openxmlformats.org/officeDocument/2006/math" xmlns="">
+    <mc:Fallback xmlns="" xmlns:m="http://schemas.openxmlformats.org/officeDocument/2006/math" xmlns:w="http://schemas.openxmlformats.org/wordprocessingml/2006/main" xmlns:wp="http://schemas.openxmlformats.org/drawingml/2006/wordprocessingDrawing" xmlns:a14="http://schemas.microsoft.com/office/drawing/2010/main" xmlns:p15="http://schemas.microsoft.com/office/powerpoint/2012/main" xmlns:p159="http://schemas.microsoft.com/office/powerpoint/2015/09/main">
       <p:transition spd="med">
         <p:fade/>
       </p:transition>
@@ -20018,7 +19457,7 @@
           <a:p>
             <a:fld id="{F52E22BF-D27E-4DF2-A532-B0FFD4CEA0F9}" type="datetimeFigureOut">
               <a:rPr lang="en-US" smtClean="0"/>
-              <a:t>1/28/22</a:t>
+              <a:t>2/1/22</a:t>
             </a:fld>
             <a:endParaRPr lang="en-US"/>
           </a:p>
@@ -23271,7 +22710,7 @@
           <a:p>
             <a:fld id="{0E6025CC-F293-4957-8040-9A397555AFA4}" type="datetimeFigureOut">
               <a:rPr lang="en-US" smtClean="0"/>
-              <a:t>1/28/22</a:t>
+              <a:t>2/1/22</a:t>
             </a:fld>
             <a:endParaRPr lang="en-US"/>
           </a:p>
@@ -25877,7 +25316,7 @@
           <a:p>
             <a:fld id="{D289A2A7-F982-4CD2-A0A6-2374192CCD93}" type="datetimeFigureOut">
               <a:rPr lang="en-US" smtClean="0"/>
-              <a:t>1/28/22</a:t>
+              <a:t>2/1/22</a:t>
             </a:fld>
             <a:endParaRPr lang="en-US"/>
           </a:p>
@@ -30467,7 +29906,7 @@
           <a:p>
             <a:fld id="{7E305E08-1F98-4A6C-87BB-7B816A27DDE8}" type="datetimeFigureOut">
               <a:rPr lang="en-US" smtClean="0"/>
-              <a:t>1/28/22</a:t>
+              <a:t>2/1/22</a:t>
             </a:fld>
             <a:endParaRPr lang="en-US"/>
           </a:p>
@@ -32074,7 +31513,7 @@
         <p:fade/>
       </p:transition>
     </mc:Choice>
-    <mc:Fallback xmlns:p159="http://schemas.microsoft.com/office/powerpoint/2015/09/main" xmlns:p15="http://schemas.microsoft.com/office/powerpoint/2012/main" xmlns:a14="http://schemas.microsoft.com/office/drawing/2010/main" xmlns:wp="http://schemas.openxmlformats.org/drawingml/2006/wordprocessingDrawing" xmlns:w="http://schemas.openxmlformats.org/wordprocessingml/2006/main" xmlns:m="http://schemas.openxmlformats.org/officeDocument/2006/math" xmlns="">
+    <mc:Fallback xmlns="" xmlns:m="http://schemas.openxmlformats.org/officeDocument/2006/math" xmlns:w="http://schemas.openxmlformats.org/wordprocessingml/2006/main" xmlns:wp="http://schemas.openxmlformats.org/drawingml/2006/wordprocessingDrawing" xmlns:a14="http://schemas.microsoft.com/office/drawing/2010/main" xmlns:p15="http://schemas.microsoft.com/office/powerpoint/2012/main" xmlns:p159="http://schemas.microsoft.com/office/powerpoint/2015/09/main">
       <p:transition spd="med">
         <p:fade/>
       </p:transition>
@@ -32268,7 +31707,7 @@
         <p:fade/>
       </p:transition>
     </mc:Choice>
-    <mc:Fallback xmlns:p159="http://schemas.microsoft.com/office/powerpoint/2015/09/main" xmlns:p15="http://schemas.microsoft.com/office/powerpoint/2012/main" xmlns:a14="http://schemas.microsoft.com/office/drawing/2010/main" xmlns:wp="http://schemas.openxmlformats.org/drawingml/2006/wordprocessingDrawing" xmlns:w="http://schemas.openxmlformats.org/wordprocessingml/2006/main" xmlns:m="http://schemas.openxmlformats.org/officeDocument/2006/math" xmlns="">
+    <mc:Fallback xmlns="" xmlns:m="http://schemas.openxmlformats.org/officeDocument/2006/math" xmlns:w="http://schemas.openxmlformats.org/wordprocessingml/2006/main" xmlns:wp="http://schemas.openxmlformats.org/drawingml/2006/wordprocessingDrawing" xmlns:a14="http://schemas.microsoft.com/office/drawing/2010/main" xmlns:p15="http://schemas.microsoft.com/office/powerpoint/2012/main" xmlns:p159="http://schemas.microsoft.com/office/powerpoint/2015/09/main">
       <p:transition spd="med">
         <p:fade/>
       </p:transition>
@@ -32388,7 +31827,7 @@
         <p:fade/>
       </p:transition>
     </mc:Choice>
-    <mc:Fallback xmlns:p159="http://schemas.microsoft.com/office/powerpoint/2015/09/main" xmlns:p15="http://schemas.microsoft.com/office/powerpoint/2012/main" xmlns:a14="http://schemas.microsoft.com/office/drawing/2010/main" xmlns:wp="http://schemas.openxmlformats.org/drawingml/2006/wordprocessingDrawing" xmlns:w="http://schemas.openxmlformats.org/wordprocessingml/2006/main" xmlns:m="http://schemas.openxmlformats.org/officeDocument/2006/math" xmlns="">
+    <mc:Fallback xmlns="" xmlns:m="http://schemas.openxmlformats.org/officeDocument/2006/math" xmlns:w="http://schemas.openxmlformats.org/wordprocessingml/2006/main" xmlns:wp="http://schemas.openxmlformats.org/drawingml/2006/wordprocessingDrawing" xmlns:a14="http://schemas.microsoft.com/office/drawing/2010/main" xmlns:p15="http://schemas.microsoft.com/office/powerpoint/2012/main" xmlns:p159="http://schemas.microsoft.com/office/powerpoint/2015/09/main">
       <p:transition spd="med">
         <p:fade/>
       </p:transition>
@@ -33156,7 +32595,7 @@
           <a:p>
             <a:fld id="{B454E054-60DC-4639-9B32-F30E405CE1FC}" type="datetimeFigureOut">
               <a:rPr lang="en-US" smtClean="0"/>
-              <a:t>1/28/22</a:t>
+              <a:t>2/1/22</a:t>
             </a:fld>
             <a:endParaRPr lang="en-US"/>
           </a:p>
@@ -33520,7 +32959,7 @@
         <p:fade/>
       </p:transition>
     </mc:Choice>
-    <mc:Fallback xmlns:p159="http://schemas.microsoft.com/office/powerpoint/2015/09/main" xmlns:p15="http://schemas.microsoft.com/office/powerpoint/2012/main" xmlns:a14="http://schemas.microsoft.com/office/drawing/2010/main" xmlns:wp="http://schemas.openxmlformats.org/drawingml/2006/wordprocessingDrawing" xmlns:w="http://schemas.openxmlformats.org/wordprocessingml/2006/main" xmlns:m="http://schemas.openxmlformats.org/officeDocument/2006/math" xmlns="">
+    <mc:Fallback xmlns="" xmlns:m="http://schemas.openxmlformats.org/officeDocument/2006/math" xmlns:w="http://schemas.openxmlformats.org/wordprocessingml/2006/main" xmlns:wp="http://schemas.openxmlformats.org/drawingml/2006/wordprocessingDrawing" xmlns:a14="http://schemas.microsoft.com/office/drawing/2010/main" xmlns:p15="http://schemas.microsoft.com/office/powerpoint/2012/main" xmlns:p159="http://schemas.microsoft.com/office/powerpoint/2015/09/main">
       <p:transition spd="med">
         <p:fade/>
       </p:transition>
@@ -33762,7 +33201,7 @@
         <p:fade/>
       </p:transition>
     </mc:Choice>
-    <mc:Fallback xmlns:p159="http://schemas.microsoft.com/office/powerpoint/2015/09/main" xmlns:p15="http://schemas.microsoft.com/office/powerpoint/2012/main" xmlns:a14="http://schemas.microsoft.com/office/drawing/2010/main" xmlns:wp="http://schemas.openxmlformats.org/drawingml/2006/wordprocessingDrawing" xmlns:w="http://schemas.openxmlformats.org/wordprocessingml/2006/main" xmlns:m="http://schemas.openxmlformats.org/officeDocument/2006/math" xmlns="">
+    <mc:Fallback xmlns="" xmlns:m="http://schemas.openxmlformats.org/officeDocument/2006/math" xmlns:w="http://schemas.openxmlformats.org/wordprocessingml/2006/main" xmlns:wp="http://schemas.openxmlformats.org/drawingml/2006/wordprocessingDrawing" xmlns:a14="http://schemas.microsoft.com/office/drawing/2010/main" xmlns:p15="http://schemas.microsoft.com/office/powerpoint/2012/main" xmlns:p159="http://schemas.microsoft.com/office/powerpoint/2015/09/main">
       <p:transition spd="med">
         <p:fade/>
       </p:transition>
@@ -36445,7 +35884,7 @@
           <a:p>
             <a:fld id="{DD26F699-A663-4376-90E7-D01CB88A1AEC}" type="datetimeFigureOut">
               <a:rPr lang="en-US" smtClean="0"/>
-              <a:t>1/28/22</a:t>
+              <a:t>2/1/22</a:t>
             </a:fld>
             <a:endParaRPr lang="en-US"/>
           </a:p>
@@ -39048,7 +38487,7 @@
           <a:p>
             <a:fld id="{1A800B83-E056-47D7-8A0D-C54924A85E1A}" type="datetimeFigureOut">
               <a:rPr lang="en-US" smtClean="0"/>
-              <a:t>1/28/22</a:t>
+              <a:t>2/1/22</a:t>
             </a:fld>
             <a:endParaRPr lang="en-US"/>
           </a:p>
@@ -43131,7 +42570,7 @@
           <a:p>
             <a:fld id="{425A2EB2-2BA8-4595-AF47-787B0DC3DB10}" type="datetimeFigureOut">
               <a:rPr lang="en-US" smtClean="0"/>
-              <a:t>1/28/22</a:t>
+              <a:t>2/1/22</a:t>
             </a:fld>
             <a:endParaRPr lang="en-US"/>
           </a:p>
@@ -45471,7 +44910,7 @@
         <p:fade/>
       </p:transition>
     </mc:Choice>
-    <mc:Fallback xmlns:p159="http://schemas.microsoft.com/office/powerpoint/2015/09/main" xmlns:p15="http://schemas.microsoft.com/office/powerpoint/2012/main" xmlns:a14="http://schemas.microsoft.com/office/drawing/2010/main" xmlns:wp="http://schemas.openxmlformats.org/drawingml/2006/wordprocessingDrawing" xmlns:w="http://schemas.openxmlformats.org/wordprocessingml/2006/main" xmlns:m="http://schemas.openxmlformats.org/officeDocument/2006/math" xmlns="">
+    <mc:Fallback xmlns="" xmlns:m="http://schemas.openxmlformats.org/officeDocument/2006/math" xmlns:w="http://schemas.openxmlformats.org/wordprocessingml/2006/main" xmlns:wp="http://schemas.openxmlformats.org/drawingml/2006/wordprocessingDrawing" xmlns:a14="http://schemas.microsoft.com/office/drawing/2010/main" xmlns:p15="http://schemas.microsoft.com/office/powerpoint/2012/main" xmlns:p159="http://schemas.microsoft.com/office/powerpoint/2015/09/main">
       <p:transition spd="med">
         <p:fade/>
       </p:transition>
@@ -45662,7 +45101,7 @@
         <p:fade/>
       </p:transition>
     </mc:Choice>
-    <mc:Fallback xmlns:p159="http://schemas.microsoft.com/office/powerpoint/2015/09/main" xmlns:p15="http://schemas.microsoft.com/office/powerpoint/2012/main" xmlns:a14="http://schemas.microsoft.com/office/drawing/2010/main" xmlns:wp="http://schemas.openxmlformats.org/drawingml/2006/wordprocessingDrawing" xmlns:w="http://schemas.openxmlformats.org/wordprocessingml/2006/main" xmlns:m="http://schemas.openxmlformats.org/officeDocument/2006/math" xmlns="">
+    <mc:Fallback xmlns="" xmlns:m="http://schemas.openxmlformats.org/officeDocument/2006/math" xmlns:w="http://schemas.openxmlformats.org/wordprocessingml/2006/main" xmlns:wp="http://schemas.openxmlformats.org/drawingml/2006/wordprocessingDrawing" xmlns:a14="http://schemas.microsoft.com/office/drawing/2010/main" xmlns:p15="http://schemas.microsoft.com/office/powerpoint/2012/main" xmlns:p159="http://schemas.microsoft.com/office/powerpoint/2015/09/main">
       <p:transition spd="med">
         <p:fade/>
       </p:transition>
@@ -45777,7 +45216,7 @@
         <p:fade/>
       </p:transition>
     </mc:Choice>
-    <mc:Fallback xmlns:p159="http://schemas.microsoft.com/office/powerpoint/2015/09/main" xmlns:p15="http://schemas.microsoft.com/office/powerpoint/2012/main" xmlns:a14="http://schemas.microsoft.com/office/drawing/2010/main" xmlns:wp="http://schemas.openxmlformats.org/drawingml/2006/wordprocessingDrawing" xmlns:w="http://schemas.openxmlformats.org/wordprocessingml/2006/main" xmlns:m="http://schemas.openxmlformats.org/officeDocument/2006/math" xmlns="">
+    <mc:Fallback xmlns="" xmlns:m="http://schemas.openxmlformats.org/officeDocument/2006/math" xmlns:w="http://schemas.openxmlformats.org/wordprocessingml/2006/main" xmlns:wp="http://schemas.openxmlformats.org/drawingml/2006/wordprocessingDrawing" xmlns:a14="http://schemas.microsoft.com/office/drawing/2010/main" xmlns:p15="http://schemas.microsoft.com/office/powerpoint/2012/main" xmlns:p159="http://schemas.microsoft.com/office/powerpoint/2015/09/main">
       <p:transition spd="med">
         <p:fade/>
       </p:transition>
@@ -46289,7 +45728,7 @@
           <a:p>
             <a:fld id="{E8FD0B7A-F5DD-4F40-B4CB-3B2C354B893A}" type="datetimeFigureOut">
               <a:rPr lang="en-US" smtClean="0"/>
-              <a:t>1/28/22</a:t>
+              <a:t>2/1/22</a:t>
             </a:fld>
             <a:endParaRPr lang="en-US"/>
           </a:p>
@@ -55738,56 +55177,78 @@
       </p:grpSpPr>
       <p:sp>
         <p:nvSpPr>
-          <p:cNvPr id="2" name="Title"/>
+          <p:cNvPr id="2" name="Title 1">
+            <a:extLst>
+              <a:ext uri="{FF2B5EF4-FFF2-40B4-BE49-F238E27FC236}">
+                <a16:creationId xmlns:a16="http://schemas.microsoft.com/office/drawing/2014/main" id="{5E439665-078F-8C45-82CC-A0DB180CD565}"/>
+              </a:ext>
+            </a:extLst>
+          </p:cNvPr>
           <p:cNvSpPr>
             <a:spLocks noGrp="1"/>
           </p:cNvSpPr>
           <p:nvPr>
-            <p:ph type="title" hasCustomPrompt="1"/>
+            <p:ph type="title"/>
           </p:nvPr>
         </p:nvSpPr>
         <p:spPr/>
         <p:txBody>
-          <a:bodyPr wrap="square" lIns="0" tIns="0" rIns="0" bIns="0" anchor="b" anchorCtr="0">
-            <a:spAutoFit/>
-          </a:bodyPr>
-          <a:lstStyle>
-            <a:lvl1pPr algn="l" defTabSz="932742" rtl="0" eaLnBrk="1" latinLnBrk="0" hangingPunct="1">
-              <a:lnSpc>
-                <a:spcPct val="90000"/>
-              </a:lnSpc>
-              <a:spcBef>
-                <a:spcPct val="0"/>
-              </a:spcBef>
-              <a:buNone/>
-              <a:defRPr lang="en-US" sz="3600" b="0" kern="1200" cap="none" spc="-50" baseline="0">
-                <a:ln w="3175">
-                  <a:noFill/>
-                </a:ln>
-                <a:solidFill>
-                  <a:schemeClr val="tx1"/>
-                </a:solidFill>
-                <a:effectLst/>
-                <a:latin typeface="+mj-lt"/>
-                <a:ea typeface="+mn-ea"/>
-                <a:cs typeface="Segoe UI" pitchFamily="34" charset="0"/>
-              </a:defRPr>
-            </a:lvl1pPr>
-          </a:lstStyle>
+          <a:bodyPr/>
+          <a:lstStyle/>
           <a:p>
             <a:r>
               <a:rPr lang="en-US" dirty="0"/>
-              <a:t>Pre-Quiz</a:t>
+              <a:t>Workshop walk-through</a:t>
+            </a:r>
+          </a:p>
+        </p:txBody>
+      </p:sp>
+      <p:sp>
+        <p:nvSpPr>
+          <p:cNvPr id="3" name="Content Placeholder 2">
+            <a:extLst>
+              <a:ext uri="{FF2B5EF4-FFF2-40B4-BE49-F238E27FC236}">
+                <a16:creationId xmlns:a16="http://schemas.microsoft.com/office/drawing/2014/main" id="{62B97BBF-598B-E845-85D1-1B63CABA2EB8}"/>
+              </a:ext>
+            </a:extLst>
+          </p:cNvPr>
+          <p:cNvSpPr>
+            <a:spLocks noGrp="1"/>
+          </p:cNvSpPr>
+          <p:nvPr>
+            <p:ph sz="quarter" idx="10"/>
+          </p:nvPr>
+        </p:nvSpPr>
+        <p:spPr>
+          <a:xfrm>
+            <a:off x="584200" y="1435100"/>
+            <a:ext cx="11018838" cy="430887"/>
+          </a:xfrm>
+        </p:spPr>
+        <p:txBody>
+          <a:bodyPr/>
+          <a:lstStyle/>
+          <a:p>
+            <a:r>
+              <a:rPr lang="en-US" dirty="0"/>
+              <a:t>Fork a repo, create a branch, make a change, push it, delete branch</a:t>
             </a:r>
           </a:p>
         </p:txBody>
       </p:sp>
     </p:spTree>
+    <p:extLst>
+      <p:ext uri="{BB962C8B-B14F-4D97-AF65-F5344CB8AC3E}">
+        <p14:creationId xmlns:p14="http://schemas.microsoft.com/office/powerpoint/2010/main" val="763386508"/>
+      </p:ext>
+    </p:extLst>
   </p:cSld>
   <p:clrMapOvr>
     <a:masterClrMapping/>
   </p:clrMapOvr>
-  <p:transition/>
+  <p:transition>
+    <p:fade/>
+  </p:transition>
 </p:sld>
 </file>
 
@@ -55815,181 +55276,41 @@
             <a:spLocks noGrp="1"/>
           </p:cNvSpPr>
           <p:nvPr>
-            <p:ph type="title"/>
+            <p:ph type="title" hasCustomPrompt="1"/>
           </p:nvPr>
         </p:nvSpPr>
-        <p:spPr>
-          <a:xfrm>
-            <a:off x="588263" y="457200"/>
-            <a:ext cx="11018520" cy="548640"/>
-          </a:xfrm>
-        </p:spPr>
-        <p:txBody>
-          <a:bodyPr/>
+        <p:spPr/>
+        <p:txBody>
+          <a:bodyPr wrap="square" lIns="0" tIns="0" rIns="0" bIns="0" anchor="b" anchorCtr="0">
+            <a:spAutoFit/>
+          </a:bodyPr>
           <a:lstStyle>
-            <a:lvl1pPr>
-              <a:defRPr>
+            <a:lvl1pPr algn="l" defTabSz="932742" rtl="0" eaLnBrk="1" latinLnBrk="0" hangingPunct="1">
+              <a:lnSpc>
+                <a:spcPct val="90000"/>
+              </a:lnSpc>
+              <a:spcBef>
+                <a:spcPct val="0"/>
+              </a:spcBef>
+              <a:buNone/>
+              <a:defRPr lang="en-US" sz="3600" b="0" kern="1200" cap="none" spc="-50" baseline="0">
+                <a:ln w="3175">
+                  <a:noFill/>
+                </a:ln>
                 <a:solidFill>
                   <a:schemeClr val="tx1"/>
                 </a:solidFill>
+                <a:effectLst/>
+                <a:latin typeface="+mj-lt"/>
+                <a:ea typeface="+mn-ea"/>
+                <a:cs typeface="Segoe UI" pitchFamily="34" charset="0"/>
               </a:defRPr>
             </a:lvl1pPr>
           </a:lstStyle>
           <a:p>
             <a:r>
-              <a:rPr lang="en-US"/>
-              <a:t>Question 1</a:t>
-            </a:r>
-          </a:p>
-        </p:txBody>
-      </p:sp>
-      <p:sp>
-        <p:nvSpPr>
-          <p:cNvPr id="3" name="Subtitle"/>
-          <p:cNvSpPr>
-            <a:spLocks noGrp="1"/>
-          </p:cNvSpPr>
-          <p:nvPr>
-            <p:ph sz="quarter" idx="10"/>
-          </p:nvPr>
-        </p:nvSpPr>
-        <p:spPr>
-          <a:xfrm>
-            <a:off x="584200" y="1435100"/>
-            <a:ext cx="11018838" cy="426720"/>
-          </a:xfrm>
-        </p:spPr>
-        <p:txBody>
-          <a:bodyPr/>
-          <a:lstStyle>
-            <a:lvl1pPr marL="0" indent="0">
-              <a:buNone/>
-              <a:defRPr>
-                <a:solidFill>
-                  <a:schemeClr val="tx1"/>
-                </a:solidFill>
-              </a:defRPr>
-            </a:lvl1pPr>
-            <a:lvl2pPr>
-              <a:defRPr>
-                <a:solidFill>
-                  <a:schemeClr val="tx1"/>
-                </a:solidFill>
-              </a:defRPr>
-            </a:lvl2pPr>
-            <a:lvl3pPr>
-              <a:defRPr>
-                <a:solidFill>
-                  <a:schemeClr val="tx1"/>
-                </a:solidFill>
-              </a:defRPr>
-            </a:lvl3pPr>
-            <a:lvl4pPr>
-              <a:defRPr>
-                <a:solidFill>
-                  <a:schemeClr val="tx1"/>
-                </a:solidFill>
-              </a:defRPr>
-            </a:lvl4pPr>
-            <a:lvl5pPr>
-              <a:defRPr>
-                <a:solidFill>
-                  <a:schemeClr val="tx1"/>
-                </a:solidFill>
-              </a:defRPr>
-            </a:lvl5pPr>
-          </a:lstStyle>
-          <a:p>
-            <a:r>
-              <a:t>What is the best way to report a bug to a GitHub project?</a:t>
-            </a:r>
-          </a:p>
-        </p:txBody>
-      </p:sp>
-      <p:sp>
-        <p:nvSpPr>
-          <p:cNvPr id="4" name="New shape"/>
-          <p:cNvSpPr/>
-          <p:nvPr/>
-        </p:nvSpPr>
-        <p:spPr>
-          <a:xfrm>
-            <a:off x="586581" y="2361438"/>
-            <a:ext cx="11018838" cy="3996944"/>
-          </a:xfrm>
-          <a:prstGeom prst="rect">
-            <a:avLst/>
-          </a:prstGeom>
-          <a:noFill/>
-          <a:ln>
-            <a:noFill/>
-          </a:ln>
-        </p:spPr>
-        <p:style>
-          <a:lnRef idx="2">
-            <a:schemeClr val="accent1">
-              <a:shade val="50000"/>
-            </a:schemeClr>
-          </a:lnRef>
-          <a:fillRef idx="1">
-            <a:schemeClr val="accent1"/>
-          </a:fillRef>
-          <a:effectRef idx="0">
-            <a:schemeClr val="accent1"/>
-          </a:effectRef>
-          <a:fontRef idx="minor">
-            <a:schemeClr val="lt1"/>
-          </a:fontRef>
-        </p:style>
-        <p:txBody>
-          <a:bodyPr wrap="square" rtlCol="0" anchor="t"/>
-          <a:lstStyle/>
-          <a:p>
-            <a:pPr lvl="1" indent="-457200">
-              <a:spcAft>
-                <a:spcPct val="15000"/>
-              </a:spcAft>
-              <a:buAutoNum type="alphaUcPeriod"/>
-            </a:pPr>
-            <a:r>
-              <a:rPr sz="2500">
-                <a:solidFill>
-                  <a:srgbClr val="000000"/>
-                </a:solidFill>
-              </a:rPr>
-              <a:t>Send an email to a project owner.</a:t>
-            </a:r>
-          </a:p>
-          <a:p>
-            <a:pPr lvl="1" indent="-457200">
-              <a:spcAft>
-                <a:spcPct val="15000"/>
-              </a:spcAft>
-              <a:buAutoNum type="alphaUcPeriod"/>
-            </a:pPr>
-            <a:r>
-              <a:rPr sz="2500">
-                <a:solidFill>
-                  <a:srgbClr val="000000"/>
-                </a:solidFill>
-              </a:rPr>
-              <a:t>I don't bother reporting software bugs because there's no transparency and they never get fixed anyway.</a:t>
-            </a:r>
-          </a:p>
-          <a:p>
-            <a:pPr lvl="1" indent="-457200">
-              <a:spcAft>
-                <a:spcPct val="15000"/>
-              </a:spcAft>
-              <a:buAutoNum type="alphaUcPeriod"/>
-            </a:pPr>
-            <a:r>
-              <a:rPr sz="2500">
-                <a:solidFill>
-                  <a:srgbClr val="000000"/>
-                </a:solidFill>
-              </a:rPr>
-              <a:t>Search for the bug in the project's existing issues and create a new one if it hasn't been reported yet.</a:t>
+              <a:rPr lang="en-US" dirty="0"/>
+              <a:t>Quiz</a:t>
             </a:r>
           </a:p>
         </p:txBody>
@@ -56196,13 +55517,10 @@
               <a:buAutoNum type="alphaUcPeriod"/>
             </a:pPr>
             <a:r>
-              <a:rPr sz="2500" b="1">
+              <a:rPr sz="2500">
                 <a:solidFill>
                   <a:srgbClr val="000000"/>
                 </a:solidFill>
-                <a:highlight>
-                  <a:srgbClr val="F0F788"/>
-                </a:highlight>
               </a:rPr>
               <a:t>Search for the bug in the project's existing issues and create a new one if it hasn't been reported yet.</a:t>
             </a:r>
@@ -56265,7 +55583,7 @@
           <a:p>
             <a:r>
               <a:rPr lang="en-US"/>
-              <a:t>Question 2</a:t>
+              <a:t>Question 1</a:t>
             </a:r>
           </a:p>
         </p:txBody>
@@ -56283,7 +55601,7 @@
         <p:spPr>
           <a:xfrm>
             <a:off x="584200" y="1435100"/>
-            <a:ext cx="11018838" cy="1280160"/>
+            <a:ext cx="11018838" cy="426720"/>
           </a:xfrm>
         </p:spPr>
         <p:txBody>
@@ -56328,7 +55646,7 @@
           </a:lstStyle>
           <a:p>
             <a:r>
-              <a:t>Suppose you have created a bug fix on a new branch and want it to become part of the next production build generated from the `main` branch. What should you do next?</a:t>
+              <a:t>What is the best way to report a bug to a GitHub project?</a:t>
             </a:r>
           </a:p>
         </p:txBody>
@@ -56341,8 +55659,8 @@
         </p:nvSpPr>
         <p:spPr>
           <a:xfrm>
-            <a:off x="586581" y="3129534"/>
-            <a:ext cx="11018838" cy="3314192"/>
+            <a:off x="586581" y="2361438"/>
+            <a:ext cx="11018838" cy="3996944"/>
           </a:xfrm>
           <a:prstGeom prst="rect">
             <a:avLst/>
@@ -56384,7 +55702,7 @@
                   <a:srgbClr val="000000"/>
                 </a:solidFill>
               </a:rPr>
-              <a:t>Copy your branch changes and commit them directly to the `main` branch.</a:t>
+              <a:t>Send an email to a project owner.</a:t>
             </a:r>
           </a:p>
           <a:p>
@@ -56400,7 +55718,7 @@
                   <a:srgbClr val="000000"/>
                 </a:solidFill>
               </a:rPr>
-              <a:t>Create a pull request to merge your new branch into the `main` branch.</a:t>
+              <a:t>I don't bother reporting software bugs because there's no transparency and they never get fixed anyway.</a:t>
             </a:r>
           </a:p>
           <a:p>
@@ -56411,12 +55729,15 @@
               <a:buAutoNum type="alphaUcPeriod"/>
             </a:pPr>
             <a:r>
-              <a:rPr sz="2500">
+              <a:rPr sz="2500" b="1">
                 <a:solidFill>
                   <a:srgbClr val="000000"/>
                 </a:solidFill>
+                <a:highlight>
+                  <a:srgbClr val="F0F788"/>
+                </a:highlight>
               </a:rPr>
-              <a:t>On second thought, maybe I won't share this fix. I'll just put it in my own private version of the source code.</a:t>
+              <a:t>Search for the bug in the project's existing issues and create a new one if it hasn't been reported yet.</a:t>
             </a:r>
           </a:p>
         </p:txBody>
@@ -56607,13 +55928,10 @@
               <a:buAutoNum type="alphaUcPeriod"/>
             </a:pPr>
             <a:r>
-              <a:rPr sz="2500" b="1">
+              <a:rPr sz="2500">
                 <a:solidFill>
                   <a:srgbClr val="000000"/>
                 </a:solidFill>
-                <a:highlight>
-                  <a:srgbClr val="F0F788"/>
-                </a:highlight>
               </a:rPr>
               <a:t>Create a pull request to merge your new branch into the `main` branch.</a:t>
             </a:r>
@@ -56918,7 +56236,7 @@
           <a:p>
             <a:r>
               <a:rPr lang="en-US"/>
-              <a:t>Question 3</a:t>
+              <a:t>Question 2</a:t>
             </a:r>
           </a:p>
         </p:txBody>
@@ -56936,7 +56254,7 @@
         <p:spPr>
           <a:xfrm>
             <a:off x="584200" y="1435100"/>
-            <a:ext cx="11018838" cy="853440"/>
+            <a:ext cx="11018838" cy="1280160"/>
           </a:xfrm>
         </p:spPr>
         <p:txBody>
@@ -56981,7 +56299,7 @@
           </a:lstStyle>
           <a:p>
             <a:r>
-              <a:t>Suppose you'd like to work with a project on GitHub but you don't have write access to the project. What can you do to contribute?</a:t>
+              <a:t>Suppose you have created a bug fix on a new branch and want it to become part of the next production build generated from the `main` branch. What should you do next?</a:t>
             </a:r>
           </a:p>
         </p:txBody>
@@ -56994,8 +56312,8 @@
         </p:nvSpPr>
         <p:spPr>
           <a:xfrm>
-            <a:off x="586581" y="2745486"/>
-            <a:ext cx="11018838" cy="3655568"/>
+            <a:off x="586581" y="3129534"/>
+            <a:ext cx="11018838" cy="3314192"/>
           </a:xfrm>
           <a:prstGeom prst="rect">
             <a:avLst/>
@@ -57037,7 +56355,7 @@
                   <a:srgbClr val="000000"/>
                 </a:solidFill>
               </a:rPr>
-              <a:t>Fork the project's repository to your GitHub account, clone the forked repository to your local machine, push changes to your repository, and submit a pull request to the target (upstream) repository.</a:t>
+              <a:t>Copy your branch changes and commit them directly to the `main` branch.</a:t>
             </a:r>
           </a:p>
           <a:p>
@@ -57048,12 +56366,15 @@
               <a:buAutoNum type="alphaUcPeriod"/>
             </a:pPr>
             <a:r>
-              <a:rPr sz="2500">
+              <a:rPr sz="2500" b="1">
                 <a:solidFill>
                   <a:srgbClr val="000000"/>
                 </a:solidFill>
+                <a:highlight>
+                  <a:srgbClr val="F0F788"/>
+                </a:highlight>
               </a:rPr>
-              <a:t>Clone the project to your local machine and push updates directly to the project repository.</a:t>
+              <a:t>Create a pull request to merge your new branch into the `main` branch.</a:t>
             </a:r>
           </a:p>
           <a:p>
@@ -57069,7 +56390,7 @@
                   <a:srgbClr val="000000"/>
                 </a:solidFill>
               </a:rPr>
-              <a:t>Use git commands to make a copy of the project so that you can work locally. Submit an issue to get your changes into the target repository.</a:t>
+              <a:t>On second thought, maybe I won't share this fix. I'll just put it in my own private version of the source code.</a:t>
             </a:r>
           </a:p>
         </p:txBody>
@@ -57244,13 +56565,10 @@
               <a:buAutoNum type="alphaUcPeriod"/>
             </a:pPr>
             <a:r>
-              <a:rPr sz="2500" b="1">
+              <a:rPr sz="2500">
                 <a:solidFill>
                   <a:srgbClr val="000000"/>
                 </a:solidFill>
-                <a:highlight>
-                  <a:srgbClr val="F0F788"/>
-                </a:highlight>
               </a:rPr>
               <a:t>Fork the project's repository to your GitHub account, clone the forked repository to your local machine, push changes to your repository, and submit a pull request to the target (upstream) repository.</a:t>
             </a:r>
@@ -57317,13 +56635,7 @@
       </p:grpSpPr>
       <p:sp>
         <p:nvSpPr>
-          <p:cNvPr id="2" name="Title 1">
-            <a:extLst>
-              <a:ext uri="{FF2B5EF4-FFF2-40B4-BE49-F238E27FC236}">
-                <a16:creationId xmlns:a16="http://schemas.microsoft.com/office/drawing/2014/main" id="{5E439665-078F-8C45-82CC-A0DB180CD565}"/>
-              </a:ext>
-            </a:extLst>
-          </p:cNvPr>
+          <p:cNvPr id="2" name="Title"/>
           <p:cNvSpPr>
             <a:spLocks noGrp="1"/>
           </p:cNvSpPr>
@@ -57331,27 +56643,34 @@
             <p:ph type="title"/>
           </p:nvPr>
         </p:nvSpPr>
-        <p:spPr/>
+        <p:spPr>
+          <a:xfrm>
+            <a:off x="588263" y="457200"/>
+            <a:ext cx="11018520" cy="548640"/>
+          </a:xfrm>
+        </p:spPr>
         <p:txBody>
           <a:bodyPr/>
-          <a:lstStyle/>
-          <a:p>
-            <a:r>
-              <a:rPr lang="en-US" dirty="0"/>
-              <a:t>Workshop walk-through</a:t>
-            </a:r>
-          </a:p>
-        </p:txBody>
-      </p:sp>
-      <p:sp>
-        <p:nvSpPr>
-          <p:cNvPr id="3" name="Content Placeholder 2">
-            <a:extLst>
-              <a:ext uri="{FF2B5EF4-FFF2-40B4-BE49-F238E27FC236}">
-                <a16:creationId xmlns:a16="http://schemas.microsoft.com/office/drawing/2014/main" id="{62B97BBF-598B-E845-85D1-1B63CABA2EB8}"/>
-              </a:ext>
-            </a:extLst>
-          </p:cNvPr>
+          <a:lstStyle>
+            <a:lvl1pPr>
+              <a:defRPr>
+                <a:solidFill>
+                  <a:schemeClr val="tx1"/>
+                </a:solidFill>
+              </a:defRPr>
+            </a:lvl1pPr>
+          </a:lstStyle>
+          <a:p>
+            <a:r>
+              <a:rPr lang="en-US"/>
+              <a:t>Question 3</a:t>
+            </a:r>
+          </a:p>
+        </p:txBody>
+      </p:sp>
+      <p:sp>
+        <p:nvSpPr>
+          <p:cNvPr id="3" name="Subtitle"/>
           <p:cNvSpPr>
             <a:spLocks noGrp="1"/>
           </p:cNvSpPr>
@@ -57362,33 +56681,153 @@
         <p:spPr>
           <a:xfrm>
             <a:off x="584200" y="1435100"/>
-            <a:ext cx="11018838" cy="430887"/>
+            <a:ext cx="11018838" cy="853440"/>
           </a:xfrm>
         </p:spPr>
         <p:txBody>
           <a:bodyPr/>
+          <a:lstStyle>
+            <a:lvl1pPr marL="0" indent="0">
+              <a:buNone/>
+              <a:defRPr>
+                <a:solidFill>
+                  <a:schemeClr val="tx1"/>
+                </a:solidFill>
+              </a:defRPr>
+            </a:lvl1pPr>
+            <a:lvl2pPr>
+              <a:defRPr>
+                <a:solidFill>
+                  <a:schemeClr val="tx1"/>
+                </a:solidFill>
+              </a:defRPr>
+            </a:lvl2pPr>
+            <a:lvl3pPr>
+              <a:defRPr>
+                <a:solidFill>
+                  <a:schemeClr val="tx1"/>
+                </a:solidFill>
+              </a:defRPr>
+            </a:lvl3pPr>
+            <a:lvl4pPr>
+              <a:defRPr>
+                <a:solidFill>
+                  <a:schemeClr val="tx1"/>
+                </a:solidFill>
+              </a:defRPr>
+            </a:lvl4pPr>
+            <a:lvl5pPr>
+              <a:defRPr>
+                <a:solidFill>
+                  <a:schemeClr val="tx1"/>
+                </a:solidFill>
+              </a:defRPr>
+            </a:lvl5pPr>
+          </a:lstStyle>
+          <a:p>
+            <a:r>
+              <a:t>Suppose you'd like to work with a project on GitHub but you don't have write access to the project. What can you do to contribute?</a:t>
+            </a:r>
+          </a:p>
+        </p:txBody>
+      </p:sp>
+      <p:sp>
+        <p:nvSpPr>
+          <p:cNvPr id="4" name="New shape"/>
+          <p:cNvSpPr/>
+          <p:nvPr/>
+        </p:nvSpPr>
+        <p:spPr>
+          <a:xfrm>
+            <a:off x="586581" y="2745486"/>
+            <a:ext cx="11018838" cy="3655568"/>
+          </a:xfrm>
+          <a:prstGeom prst="rect">
+            <a:avLst/>
+          </a:prstGeom>
+          <a:noFill/>
+          <a:ln>
+            <a:noFill/>
+          </a:ln>
+        </p:spPr>
+        <p:style>
+          <a:lnRef idx="2">
+            <a:schemeClr val="accent1">
+              <a:shade val="50000"/>
+            </a:schemeClr>
+          </a:lnRef>
+          <a:fillRef idx="1">
+            <a:schemeClr val="accent1"/>
+          </a:fillRef>
+          <a:effectRef idx="0">
+            <a:schemeClr val="accent1"/>
+          </a:effectRef>
+          <a:fontRef idx="minor">
+            <a:schemeClr val="lt1"/>
+          </a:fontRef>
+        </p:style>
+        <p:txBody>
+          <a:bodyPr wrap="square" rtlCol="0" anchor="t"/>
           <a:lstStyle/>
           <a:p>
-            <a:r>
-              <a:rPr lang="en-US" dirty="0"/>
-              <a:t>Fork a repo, create a branch, make a change, push it, delete branch</a:t>
+            <a:pPr lvl="1" indent="-457200">
+              <a:spcAft>
+                <a:spcPct val="15000"/>
+              </a:spcAft>
+              <a:buAutoNum type="alphaUcPeriod"/>
+            </a:pPr>
+            <a:r>
+              <a:rPr sz="2500" b="1">
+                <a:solidFill>
+                  <a:srgbClr val="000000"/>
+                </a:solidFill>
+                <a:highlight>
+                  <a:srgbClr val="F0F788"/>
+                </a:highlight>
+              </a:rPr>
+              <a:t>Fork the project's repository to your GitHub account, clone the forked repository to your local machine, push changes to your repository, and submit a pull request to the target (upstream) repository.</a:t>
+            </a:r>
+          </a:p>
+          <a:p>
+            <a:pPr lvl="1" indent="-457200">
+              <a:spcAft>
+                <a:spcPct val="15000"/>
+              </a:spcAft>
+              <a:buAutoNum type="alphaUcPeriod"/>
+            </a:pPr>
+            <a:r>
+              <a:rPr sz="2500">
+                <a:solidFill>
+                  <a:srgbClr val="000000"/>
+                </a:solidFill>
+              </a:rPr>
+              <a:t>Clone the project to your local machine and push updates directly to the project repository.</a:t>
+            </a:r>
+          </a:p>
+          <a:p>
+            <a:pPr lvl="1" indent="-457200">
+              <a:spcAft>
+                <a:spcPct val="15000"/>
+              </a:spcAft>
+              <a:buAutoNum type="alphaUcPeriod"/>
+            </a:pPr>
+            <a:r>
+              <a:rPr sz="2500">
+                <a:solidFill>
+                  <a:srgbClr val="000000"/>
+                </a:solidFill>
+              </a:rPr>
+              <a:t>Use git commands to make a copy of the project so that you can work locally. Submit an issue to get your changes into the target repository.</a:t>
             </a:r>
           </a:p>
         </p:txBody>
       </p:sp>
     </p:spTree>
-    <p:extLst>
-      <p:ext uri="{BB962C8B-B14F-4D97-AF65-F5344CB8AC3E}">
-        <p14:creationId xmlns:p14="http://schemas.microsoft.com/office/powerpoint/2010/main" val="763386508"/>
-      </p:ext>
-    </p:extLst>
   </p:cSld>
   <p:clrMapOvr>
     <a:masterClrMapping/>
   </p:clrMapOvr>
-  <p:transition>
-    <p:fade/>
-  </p:transition>
+  <p:transition/>
 </p:sld>
 </file>
 
@@ -57449,8 +56888,8 @@
           </a:lstStyle>
           <a:p>
             <a:r>
-              <a:rPr lang="en-US" dirty="0"/>
-              <a:t>Post-Quiz</a:t>
+              <a:rPr lang="en-US"/>
+              <a:t>Summary</a:t>
             </a:r>
           </a:p>
         </p:txBody>
@@ -57511,7 +56950,7 @@
           <a:p>
             <a:r>
               <a:rPr lang="en-US"/>
-              <a:t>Question 1</a:t>
+              <a:t>Summary</a:t>
             </a:r>
           </a:p>
         </p:txBody>
@@ -57529,7 +56968,7 @@
         <p:spPr>
           <a:xfrm>
             <a:off x="584200" y="1435100"/>
-            <a:ext cx="11018838" cy="853440"/>
+            <a:ext cx="11018838" cy="1292662"/>
           </a:xfrm>
         </p:spPr>
         <p:txBody>
@@ -57574,111 +57013,32 @@
           </a:lstStyle>
           <a:p>
             <a:r>
-              <a:t>What is the best place on a GitHub repository to find where you can help a project?</a:t>
-            </a:r>
-          </a:p>
-        </p:txBody>
-      </p:sp>
-      <p:sp>
-        <p:nvSpPr>
-          <p:cNvPr id="4" name="New shape"/>
-          <p:cNvSpPr/>
-          <p:nvPr/>
-        </p:nvSpPr>
-        <p:spPr>
-          <a:xfrm>
-            <a:off x="586581" y="2745486"/>
-            <a:ext cx="11018838" cy="3655568"/>
-          </a:xfrm>
-          <a:prstGeom prst="rect">
-            <a:avLst/>
-          </a:prstGeom>
-          <a:noFill/>
-          <a:ln>
-            <a:noFill/>
-          </a:ln>
-        </p:spPr>
-        <p:style>
-          <a:lnRef idx="2">
-            <a:schemeClr val="accent1">
-              <a:shade val="50000"/>
-            </a:schemeClr>
-          </a:lnRef>
-          <a:fillRef idx="1">
-            <a:schemeClr val="accent1"/>
-          </a:fillRef>
-          <a:effectRef idx="0">
-            <a:schemeClr val="accent1"/>
-          </a:effectRef>
-          <a:fontRef idx="minor">
-            <a:schemeClr val="lt1"/>
-          </a:fontRef>
-        </p:style>
-        <p:txBody>
-          <a:bodyPr wrap="square" rtlCol="0" anchor="t"/>
-          <a:lstStyle/>
-          <a:p>
-            <a:pPr lvl="1" indent="-457200">
-              <a:spcAft>
-                <a:spcPct val="15000"/>
-              </a:spcAft>
-              <a:buAutoNum type="alphaUcPeriod"/>
-            </a:pPr>
-            <a:r>
-              <a:rPr sz="2500">
-                <a:solidFill>
-                  <a:srgbClr val="000000"/>
-                </a:solidFill>
-              </a:rPr>
-              <a:t>The README file</a:t>
-            </a:r>
-          </a:p>
-          <a:p>
-            <a:pPr lvl="1" indent="-457200">
-              <a:spcAft>
-                <a:spcPct val="15000"/>
-              </a:spcAft>
-              <a:buAutoNum type="alphaUcPeriod"/>
-            </a:pPr>
-            <a:r>
-              <a:rPr sz="2500">
-                <a:solidFill>
-                  <a:srgbClr val="000000"/>
-                </a:solidFill>
-              </a:rPr>
-              <a:t>The issues list</a:t>
-            </a:r>
-          </a:p>
-          <a:p>
-            <a:pPr lvl="1" indent="-457200">
-              <a:spcAft>
-                <a:spcPct val="15000"/>
-              </a:spcAft>
-              <a:buAutoNum type="alphaUcPeriod"/>
-            </a:pPr>
-            <a:r>
-              <a:rPr sz="2500">
-                <a:solidFill>
-                  <a:srgbClr val="000000"/>
-                </a:solidFill>
-              </a:rPr>
-              <a:t>The search bar</a:t>
-            </a:r>
-          </a:p>
-          <a:p>
-            <a:pPr lvl="1" indent="-457200">
-              <a:spcAft>
-                <a:spcPct val="15000"/>
-              </a:spcAft>
-              <a:buAutoNum type="alphaUcPeriod"/>
-            </a:pPr>
-            <a:r>
-              <a:rPr sz="2500">
-                <a:solidFill>
-                  <a:srgbClr val="000000"/>
-                </a:solidFill>
-              </a:rPr>
-              <a:t>The LICENSE file</a:t>
+              <a:rPr dirty="0"/>
+              <a:t>In this module, you learned about the key features of GitHub</a:t>
+            </a:r>
+            <a:r>
+              <a:rPr lang="en-US" dirty="0"/>
+              <a:t> and how to use it with </a:t>
+            </a:r>
+            <a:r>
+              <a:rPr lang="en-US" dirty="0" err="1"/>
+              <a:t>GitHub.dev</a:t>
+            </a:r>
+            <a:r>
+              <a:rPr lang="en-US" dirty="0"/>
+              <a:t>,</a:t>
+            </a:r>
+            <a:r>
+              <a:rPr dirty="0"/>
+              <a:t> including commits,</a:t>
+            </a:r>
+            <a:r>
+              <a:rPr lang="en-US" dirty="0"/>
+              <a:t> branches,</a:t>
+            </a:r>
+            <a:r>
+              <a:rPr dirty="0"/>
+              <a:t> and pull requests.</a:t>
             </a:r>
           </a:p>
         </p:txBody>
@@ -57739,7 +57099,7 @@
           <a:p>
             <a:r>
               <a:rPr lang="en-US"/>
-              <a:t>Question 1</a:t>
+              <a:t>Learn more</a:t>
             </a:r>
           </a:p>
         </p:txBody>
@@ -57802,7 +57162,7 @@
           </a:lstStyle>
           <a:p>
             <a:r>
-              <a:t>What is the best place on a GitHub repository to find where you can help a project?</a:t>
+              <a:t>Here are some links to more information on the topics we discussed in this module.</a:t>
             </a:r>
           </a:p>
         </p:txBody>
@@ -57815,8 +57175,8 @@
         </p:nvSpPr>
         <p:spPr>
           <a:xfrm>
-            <a:off x="586581" y="2745486"/>
-            <a:ext cx="11018838" cy="3655568"/>
+            <a:off x="609600" y="2517013"/>
+            <a:ext cx="10972800" cy="2670048"/>
           </a:xfrm>
           <a:prstGeom prst="rect">
             <a:avLst/>
@@ -57843,73 +57203,148 @@
           </a:fontRef>
         </p:style>
         <p:txBody>
-          <a:bodyPr wrap="square" rtlCol="0" anchor="t"/>
+          <a:bodyPr rtlCol="0" anchor="ctr">
+            <a:spAutoFit/>
+          </a:bodyPr>
           <a:lstStyle/>
           <a:p>
-            <a:pPr lvl="1" indent="-457200">
+            <a:pPr marL="635000" indent="-365760">
+              <a:spcBef>
+                <a:spcPct val="20000"/>
+              </a:spcBef>
               <a:spcAft>
-                <a:spcPct val="15000"/>
+                <a:spcPct val="20000"/>
               </a:spcAft>
-              <a:buAutoNum type="alphaUcPeriod"/>
+              <a:buChar char="•"/>
             </a:pPr>
             <a:r>
-              <a:rPr sz="2500">
+              <a:rPr sz="1800">
                 <a:solidFill>
                   <a:srgbClr val="000000"/>
                 </a:solidFill>
+                <a:hlinkClick r:id="rId3"/>
               </a:rPr>
-              <a:t>The README file</a:t>
-            </a:r>
-          </a:p>
-          <a:p>
-            <a:pPr lvl="1" indent="-457200">
+              <a:t>Setting up and managing organizations and teams</a:t>
+            </a:r>
+          </a:p>
+          <a:p>
+            <a:pPr marL="635000" indent="-365760">
+              <a:spcBef>
+                <a:spcPct val="20000"/>
+              </a:spcBef>
               <a:spcAft>
-                <a:spcPct val="15000"/>
+                <a:spcPct val="20000"/>
               </a:spcAft>
-              <a:buAutoNum type="alphaUcPeriod"/>
+              <a:buChar char="•"/>
             </a:pPr>
             <a:r>
-              <a:rPr sz="2500" b="1">
+              <a:rPr sz="1800">
                 <a:solidFill>
                   <a:srgbClr val="000000"/>
                 </a:solidFill>
-                <a:highlight>
-                  <a:srgbClr val="F0F788"/>
-                </a:highlight>
+                <a:hlinkClick r:id="rId4"/>
               </a:rPr>
-              <a:t>The issues list</a:t>
-            </a:r>
-          </a:p>
-          <a:p>
-            <a:pPr lvl="1" indent="-457200">
+              <a:t>Committing changes to your project</a:t>
+            </a:r>
+          </a:p>
+          <a:p>
+            <a:pPr marL="635000" indent="-365760">
+              <a:spcBef>
+                <a:spcPct val="20000"/>
+              </a:spcBef>
               <a:spcAft>
-                <a:spcPct val="15000"/>
+                <a:spcPct val="20000"/>
               </a:spcAft>
-              <a:buAutoNum type="alphaUcPeriod"/>
+              <a:buChar char="•"/>
             </a:pPr>
             <a:r>
-              <a:rPr sz="2500">
+              <a:rPr sz="1800">
                 <a:solidFill>
                   <a:srgbClr val="000000"/>
                 </a:solidFill>
+                <a:hlinkClick r:id="rId5"/>
               </a:rPr>
-              <a:t>The search bar</a:t>
-            </a:r>
-          </a:p>
-          <a:p>
-            <a:pPr lvl="1" indent="-457200">
+              <a:t>Collaborating with issues and pull requests</a:t>
+            </a:r>
+          </a:p>
+          <a:p>
+            <a:pPr marL="635000" indent="-365760">
+              <a:spcBef>
+                <a:spcPct val="20000"/>
+              </a:spcBef>
               <a:spcAft>
-                <a:spcPct val="15000"/>
+                <a:spcPct val="20000"/>
               </a:spcAft>
-              <a:buAutoNum type="alphaUcPeriod"/>
+              <a:buChar char="•"/>
             </a:pPr>
             <a:r>
-              <a:rPr sz="2500">
+              <a:rPr sz="1800">
                 <a:solidFill>
                   <a:srgbClr val="000000"/>
                 </a:solidFill>
+                <a:hlinkClick r:id="rId6"/>
               </a:rPr>
-              <a:t>The LICENSE file</a:t>
+              <a:t>About the role of labels</a:t>
+            </a:r>
+          </a:p>
+          <a:p>
+            <a:pPr marL="635000" indent="-365760">
+              <a:spcBef>
+                <a:spcPct val="20000"/>
+              </a:spcBef>
+              <a:spcAft>
+                <a:spcPct val="20000"/>
+              </a:spcAft>
+              <a:buChar char="•"/>
+            </a:pPr>
+            <a:r>
+              <a:rPr sz="1800">
+                <a:solidFill>
+                  <a:srgbClr val="000000"/>
+                </a:solidFill>
+                <a:hlinkClick r:id="rId7"/>
+              </a:rPr>
+              <a:t>GitHub Actions</a:t>
+            </a:r>
+          </a:p>
+          <a:p>
+            <a:pPr marL="635000" indent="-365760">
+              <a:spcBef>
+                <a:spcPct val="20000"/>
+              </a:spcBef>
+              <a:spcAft>
+                <a:spcPct val="20000"/>
+              </a:spcAft>
+              <a:buChar char="•"/>
+            </a:pPr>
+            <a:r>
+              <a:rPr sz="1800">
+                <a:solidFill>
+                  <a:srgbClr val="000000"/>
+                </a:solidFill>
+                <a:hlinkClick r:id="rId8"/>
+              </a:rPr>
+              <a:t>Fork a repo</a:t>
+            </a:r>
+          </a:p>
+          <a:p>
+            <a:pPr marL="635000" indent="-365760">
+              <a:spcBef>
+                <a:spcPct val="20000"/>
+              </a:spcBef>
+              <a:spcAft>
+                <a:spcPct val="20000"/>
+              </a:spcAft>
+              <a:buChar char="•"/>
+            </a:pPr>
+            <a:r>
+              <a:rPr sz="1800">
+                <a:solidFill>
+                  <a:srgbClr val="000000"/>
+                </a:solidFill>
+                <a:hlinkClick r:id="rId9"/>
+              </a:rPr>
+              <a:t>Working with GitHub Pages</a:t>
             </a:r>
           </a:p>
         </p:txBody>
@@ -57940,898 +57375,6 @@
           <a:chExt cx="0" cy="0"/>
         </a:xfrm>
       </p:grpSpPr>
-      <p:sp>
-        <p:nvSpPr>
-          <p:cNvPr id="2" name="Title"/>
-          <p:cNvSpPr>
-            <a:spLocks noGrp="1"/>
-          </p:cNvSpPr>
-          <p:nvPr>
-            <p:ph type="title"/>
-          </p:nvPr>
-        </p:nvSpPr>
-        <p:spPr>
-          <a:xfrm>
-            <a:off x="588263" y="457200"/>
-            <a:ext cx="11018520" cy="548640"/>
-          </a:xfrm>
-        </p:spPr>
-        <p:txBody>
-          <a:bodyPr/>
-          <a:lstStyle>
-            <a:lvl1pPr>
-              <a:defRPr>
-                <a:solidFill>
-                  <a:schemeClr val="tx1"/>
-                </a:solidFill>
-              </a:defRPr>
-            </a:lvl1pPr>
-          </a:lstStyle>
-          <a:p>
-            <a:r>
-              <a:rPr lang="en-US"/>
-              <a:t>Question 2</a:t>
-            </a:r>
-          </a:p>
-        </p:txBody>
-      </p:sp>
-      <p:sp>
-        <p:nvSpPr>
-          <p:cNvPr id="3" name="Subtitle"/>
-          <p:cNvSpPr>
-            <a:spLocks noGrp="1"/>
-          </p:cNvSpPr>
-          <p:nvPr>
-            <p:ph sz="quarter" idx="10"/>
-          </p:nvPr>
-        </p:nvSpPr>
-        <p:spPr>
-          <a:xfrm>
-            <a:off x="584200" y="1435100"/>
-            <a:ext cx="11018838" cy="426720"/>
-          </a:xfrm>
-        </p:spPr>
-        <p:txBody>
-          <a:bodyPr/>
-          <a:lstStyle>
-            <a:lvl1pPr marL="0" indent="0">
-              <a:buNone/>
-              <a:defRPr>
-                <a:solidFill>
-                  <a:schemeClr val="tx1"/>
-                </a:solidFill>
-              </a:defRPr>
-            </a:lvl1pPr>
-            <a:lvl2pPr>
-              <a:defRPr>
-                <a:solidFill>
-                  <a:schemeClr val="tx1"/>
-                </a:solidFill>
-              </a:defRPr>
-            </a:lvl2pPr>
-            <a:lvl3pPr>
-              <a:defRPr>
-                <a:solidFill>
-                  <a:schemeClr val="tx1"/>
-                </a:solidFill>
-              </a:defRPr>
-            </a:lvl3pPr>
-            <a:lvl4pPr>
-              <a:defRPr>
-                <a:solidFill>
-                  <a:schemeClr val="tx1"/>
-                </a:solidFill>
-              </a:defRPr>
-            </a:lvl4pPr>
-            <a:lvl5pPr>
-              <a:defRPr>
-                <a:solidFill>
-                  <a:schemeClr val="tx1"/>
-                </a:solidFill>
-              </a:defRPr>
-            </a:lvl5pPr>
-          </a:lstStyle>
-          <a:p>
-            <a:r>
-              <a:t>What is the preferred way to ask for help or reviews on a pull request?</a:t>
-            </a:r>
-          </a:p>
-        </p:txBody>
-      </p:sp>
-      <p:sp>
-        <p:nvSpPr>
-          <p:cNvPr id="4" name="New shape"/>
-          <p:cNvSpPr/>
-          <p:nvPr/>
-        </p:nvSpPr>
-        <p:spPr>
-          <a:xfrm>
-            <a:off x="586581" y="2361438"/>
-            <a:ext cx="11018838" cy="3996944"/>
-          </a:xfrm>
-          <a:prstGeom prst="rect">
-            <a:avLst/>
-          </a:prstGeom>
-          <a:noFill/>
-          <a:ln>
-            <a:noFill/>
-          </a:ln>
-        </p:spPr>
-        <p:style>
-          <a:lnRef idx="2">
-            <a:schemeClr val="accent1">
-              <a:shade val="50000"/>
-            </a:schemeClr>
-          </a:lnRef>
-          <a:fillRef idx="1">
-            <a:schemeClr val="accent1"/>
-          </a:fillRef>
-          <a:effectRef idx="0">
-            <a:schemeClr val="accent1"/>
-          </a:effectRef>
-          <a:fontRef idx="minor">
-            <a:schemeClr val="lt1"/>
-          </a:fontRef>
-        </p:style>
-        <p:txBody>
-          <a:bodyPr wrap="square" rtlCol="0" anchor="t"/>
-          <a:lstStyle/>
-          <a:p>
-            <a:pPr lvl="1" indent="-457200">
-              <a:spcAft>
-                <a:spcPct val="15000"/>
-              </a:spcAft>
-              <a:buAutoNum type="alphaUcPeriod"/>
-            </a:pPr>
-            <a:r>
-              <a:rPr sz="2500">
-                <a:solidFill>
-                  <a:srgbClr val="000000"/>
-                </a:solidFill>
-              </a:rPr>
-              <a:t>Send a negative or disrespectful comment to the project's maintainers via social media.</a:t>
-            </a:r>
-          </a:p>
-          <a:p>
-            <a:pPr lvl="1" indent="-457200">
-              <a:spcAft>
-                <a:spcPct val="15000"/>
-              </a:spcAft>
-              <a:buAutoNum type="alphaUcPeriod"/>
-            </a:pPr>
-            <a:r>
-              <a:rPr sz="2500">
-                <a:solidFill>
-                  <a:srgbClr val="000000"/>
-                </a:solidFill>
-              </a:rPr>
-              <a:t>Create an issue</a:t>
-            </a:r>
-          </a:p>
-          <a:p>
-            <a:pPr lvl="1" indent="-457200">
-              <a:spcAft>
-                <a:spcPct val="15000"/>
-              </a:spcAft>
-              <a:buAutoNum type="alphaUcPeriod"/>
-            </a:pPr>
-            <a:r>
-              <a:rPr sz="2500">
-                <a:solidFill>
-                  <a:srgbClr val="000000"/>
-                </a:solidFill>
-              </a:rPr>
-              <a:t>Add comment in the pull request</a:t>
-            </a:r>
-          </a:p>
-          <a:p>
-            <a:pPr lvl="1" indent="-457200">
-              <a:spcAft>
-                <a:spcPct val="15000"/>
-              </a:spcAft>
-              <a:buAutoNum type="alphaUcPeriod"/>
-            </a:pPr>
-            <a:r>
-              <a:rPr sz="2500">
-                <a:solidFill>
-                  <a:srgbClr val="000000"/>
-                </a:solidFill>
-              </a:rPr>
-              <a:t>Send an email to a random committer on the project</a:t>
-            </a:r>
-          </a:p>
-        </p:txBody>
-      </p:sp>
-    </p:spTree>
-  </p:cSld>
-  <p:clrMapOvr>
-    <a:masterClrMapping/>
-  </p:clrMapOvr>
-  <p:transition/>
-</p:sld>
-</file>
-
-<file path=ppt/slides/slide27.xml><?xml version="1.0" encoding="utf-8"?>
-<p:sld xmlns:a="http://schemas.openxmlformats.org/drawingml/2006/main" xmlns:r="http://schemas.openxmlformats.org/officeDocument/2006/relationships" xmlns:p="http://schemas.openxmlformats.org/presentationml/2006/main">
-  <p:cSld>
-    <p:spTree>
-      <p:nvGrpSpPr>
-        <p:cNvPr id="1" name=""/>
-        <p:cNvGrpSpPr/>
-        <p:nvPr/>
-      </p:nvGrpSpPr>
-      <p:grpSpPr>
-        <a:xfrm>
-          <a:off x="0" y="0"/>
-          <a:ext cx="0" cy="0"/>
-          <a:chOff x="0" y="0"/>
-          <a:chExt cx="0" cy="0"/>
-        </a:xfrm>
-      </p:grpSpPr>
-      <p:sp>
-        <p:nvSpPr>
-          <p:cNvPr id="2" name="Title"/>
-          <p:cNvSpPr>
-            <a:spLocks noGrp="1"/>
-          </p:cNvSpPr>
-          <p:nvPr>
-            <p:ph type="title"/>
-          </p:nvPr>
-        </p:nvSpPr>
-        <p:spPr>
-          <a:xfrm>
-            <a:off x="588263" y="457200"/>
-            <a:ext cx="11018520" cy="548640"/>
-          </a:xfrm>
-        </p:spPr>
-        <p:txBody>
-          <a:bodyPr/>
-          <a:lstStyle>
-            <a:lvl1pPr>
-              <a:defRPr>
-                <a:solidFill>
-                  <a:schemeClr val="tx1"/>
-                </a:solidFill>
-              </a:defRPr>
-            </a:lvl1pPr>
-          </a:lstStyle>
-          <a:p>
-            <a:r>
-              <a:rPr lang="en-US"/>
-              <a:t>Question 2</a:t>
-            </a:r>
-          </a:p>
-        </p:txBody>
-      </p:sp>
-      <p:sp>
-        <p:nvSpPr>
-          <p:cNvPr id="3" name="Subtitle"/>
-          <p:cNvSpPr>
-            <a:spLocks noGrp="1"/>
-          </p:cNvSpPr>
-          <p:nvPr>
-            <p:ph sz="quarter" idx="10"/>
-          </p:nvPr>
-        </p:nvSpPr>
-        <p:spPr>
-          <a:xfrm>
-            <a:off x="584200" y="1435100"/>
-            <a:ext cx="11018838" cy="426720"/>
-          </a:xfrm>
-        </p:spPr>
-        <p:txBody>
-          <a:bodyPr/>
-          <a:lstStyle>
-            <a:lvl1pPr marL="0" indent="0">
-              <a:buNone/>
-              <a:defRPr>
-                <a:solidFill>
-                  <a:schemeClr val="tx1"/>
-                </a:solidFill>
-              </a:defRPr>
-            </a:lvl1pPr>
-            <a:lvl2pPr>
-              <a:defRPr>
-                <a:solidFill>
-                  <a:schemeClr val="tx1"/>
-                </a:solidFill>
-              </a:defRPr>
-            </a:lvl2pPr>
-            <a:lvl3pPr>
-              <a:defRPr>
-                <a:solidFill>
-                  <a:schemeClr val="tx1"/>
-                </a:solidFill>
-              </a:defRPr>
-            </a:lvl3pPr>
-            <a:lvl4pPr>
-              <a:defRPr>
-                <a:solidFill>
-                  <a:schemeClr val="tx1"/>
-                </a:solidFill>
-              </a:defRPr>
-            </a:lvl4pPr>
-            <a:lvl5pPr>
-              <a:defRPr>
-                <a:solidFill>
-                  <a:schemeClr val="tx1"/>
-                </a:solidFill>
-              </a:defRPr>
-            </a:lvl5pPr>
-          </a:lstStyle>
-          <a:p>
-            <a:r>
-              <a:t>What is the preferred way to ask for help or reviews on a pull request?</a:t>
-            </a:r>
-          </a:p>
-        </p:txBody>
-      </p:sp>
-      <p:sp>
-        <p:nvSpPr>
-          <p:cNvPr id="4" name="New shape"/>
-          <p:cNvSpPr/>
-          <p:nvPr/>
-        </p:nvSpPr>
-        <p:spPr>
-          <a:xfrm>
-            <a:off x="586581" y="2361438"/>
-            <a:ext cx="11018838" cy="3996944"/>
-          </a:xfrm>
-          <a:prstGeom prst="rect">
-            <a:avLst/>
-          </a:prstGeom>
-          <a:noFill/>
-          <a:ln>
-            <a:noFill/>
-          </a:ln>
-        </p:spPr>
-        <p:style>
-          <a:lnRef idx="2">
-            <a:schemeClr val="accent1">
-              <a:shade val="50000"/>
-            </a:schemeClr>
-          </a:lnRef>
-          <a:fillRef idx="1">
-            <a:schemeClr val="accent1"/>
-          </a:fillRef>
-          <a:effectRef idx="0">
-            <a:schemeClr val="accent1"/>
-          </a:effectRef>
-          <a:fontRef idx="minor">
-            <a:schemeClr val="lt1"/>
-          </a:fontRef>
-        </p:style>
-        <p:txBody>
-          <a:bodyPr wrap="square" rtlCol="0" anchor="t"/>
-          <a:lstStyle/>
-          <a:p>
-            <a:pPr lvl="1" indent="-457200">
-              <a:spcAft>
-                <a:spcPct val="15000"/>
-              </a:spcAft>
-              <a:buAutoNum type="alphaUcPeriod"/>
-            </a:pPr>
-            <a:r>
-              <a:rPr sz="2500">
-                <a:solidFill>
-                  <a:srgbClr val="000000"/>
-                </a:solidFill>
-              </a:rPr>
-              <a:t>Send a negative or disrespectful comment to the project's maintainers via social media.</a:t>
-            </a:r>
-          </a:p>
-          <a:p>
-            <a:pPr lvl="1" indent="-457200">
-              <a:spcAft>
-                <a:spcPct val="15000"/>
-              </a:spcAft>
-              <a:buAutoNum type="alphaUcPeriod"/>
-            </a:pPr>
-            <a:r>
-              <a:rPr sz="2500">
-                <a:solidFill>
-                  <a:srgbClr val="000000"/>
-                </a:solidFill>
-              </a:rPr>
-              <a:t>Create an issue</a:t>
-            </a:r>
-          </a:p>
-          <a:p>
-            <a:pPr lvl="1" indent="-457200">
-              <a:spcAft>
-                <a:spcPct val="15000"/>
-              </a:spcAft>
-              <a:buAutoNum type="alphaUcPeriod"/>
-            </a:pPr>
-            <a:r>
-              <a:rPr sz="2500" b="1">
-                <a:solidFill>
-                  <a:srgbClr val="000000"/>
-                </a:solidFill>
-                <a:highlight>
-                  <a:srgbClr val="F0F788"/>
-                </a:highlight>
-              </a:rPr>
-              <a:t>Add comment in the pull request</a:t>
-            </a:r>
-          </a:p>
-          <a:p>
-            <a:pPr lvl="1" indent="-457200">
-              <a:spcAft>
-                <a:spcPct val="15000"/>
-              </a:spcAft>
-              <a:buAutoNum type="alphaUcPeriod"/>
-            </a:pPr>
-            <a:r>
-              <a:rPr sz="2500">
-                <a:solidFill>
-                  <a:srgbClr val="000000"/>
-                </a:solidFill>
-              </a:rPr>
-              <a:t>Send an email to a random committer on the project</a:t>
-            </a:r>
-          </a:p>
-        </p:txBody>
-      </p:sp>
-    </p:spTree>
-  </p:cSld>
-  <p:clrMapOvr>
-    <a:masterClrMapping/>
-  </p:clrMapOvr>
-  <p:transition/>
-</p:sld>
-</file>
-
-<file path=ppt/slides/slide28.xml><?xml version="1.0" encoding="utf-8"?>
-<p:sld xmlns:a="http://schemas.openxmlformats.org/drawingml/2006/main" xmlns:r="http://schemas.openxmlformats.org/officeDocument/2006/relationships" xmlns:p="http://schemas.openxmlformats.org/presentationml/2006/main">
-  <p:cSld>
-    <p:spTree>
-      <p:nvGrpSpPr>
-        <p:cNvPr id="1" name=""/>
-        <p:cNvGrpSpPr/>
-        <p:nvPr/>
-      </p:nvGrpSpPr>
-      <p:grpSpPr>
-        <a:xfrm>
-          <a:off x="0" y="0"/>
-          <a:ext cx="0" cy="0"/>
-          <a:chOff x="0" y="0"/>
-          <a:chExt cx="0" cy="0"/>
-        </a:xfrm>
-      </p:grpSpPr>
-      <p:sp>
-        <p:nvSpPr>
-          <p:cNvPr id="2" name="Title"/>
-          <p:cNvSpPr>
-            <a:spLocks noGrp="1"/>
-          </p:cNvSpPr>
-          <p:nvPr>
-            <p:ph type="title"/>
-          </p:nvPr>
-        </p:nvSpPr>
-        <p:spPr>
-          <a:xfrm>
-            <a:off x="588263" y="457200"/>
-            <a:ext cx="11018520" cy="548640"/>
-          </a:xfrm>
-        </p:spPr>
-        <p:txBody>
-          <a:bodyPr/>
-          <a:lstStyle>
-            <a:lvl1pPr>
-              <a:defRPr>
-                <a:solidFill>
-                  <a:schemeClr val="tx1"/>
-                </a:solidFill>
-              </a:defRPr>
-            </a:lvl1pPr>
-          </a:lstStyle>
-          <a:p>
-            <a:r>
-              <a:rPr lang="en-US"/>
-              <a:t>Question 3</a:t>
-            </a:r>
-          </a:p>
-        </p:txBody>
-      </p:sp>
-      <p:sp>
-        <p:nvSpPr>
-          <p:cNvPr id="3" name="Subtitle"/>
-          <p:cNvSpPr>
-            <a:spLocks noGrp="1"/>
-          </p:cNvSpPr>
-          <p:nvPr>
-            <p:ph sz="quarter" idx="10"/>
-          </p:nvPr>
-        </p:nvSpPr>
-        <p:spPr>
-          <a:xfrm>
-            <a:off x="584200" y="1435100"/>
-            <a:ext cx="11018838" cy="426720"/>
-          </a:xfrm>
-        </p:spPr>
-        <p:txBody>
-          <a:bodyPr/>
-          <a:lstStyle>
-            <a:lvl1pPr marL="0" indent="0">
-              <a:buNone/>
-              <a:defRPr>
-                <a:solidFill>
-                  <a:schemeClr val="tx1"/>
-                </a:solidFill>
-              </a:defRPr>
-            </a:lvl1pPr>
-            <a:lvl2pPr>
-              <a:defRPr>
-                <a:solidFill>
-                  <a:schemeClr val="tx1"/>
-                </a:solidFill>
-              </a:defRPr>
-            </a:lvl2pPr>
-            <a:lvl3pPr>
-              <a:defRPr>
-                <a:solidFill>
-                  <a:schemeClr val="tx1"/>
-                </a:solidFill>
-              </a:defRPr>
-            </a:lvl3pPr>
-            <a:lvl4pPr>
-              <a:defRPr>
-                <a:solidFill>
-                  <a:schemeClr val="tx1"/>
-                </a:solidFill>
-              </a:defRPr>
-            </a:lvl4pPr>
-            <a:lvl5pPr>
-              <a:defRPr>
-                <a:solidFill>
-                  <a:schemeClr val="tx1"/>
-                </a:solidFill>
-              </a:defRPr>
-            </a:lvl5pPr>
-          </a:lstStyle>
-          <a:p>
-            <a:r>
-              <a:t>What is needed before you can create a pull request on GitHub?</a:t>
-            </a:r>
-          </a:p>
-        </p:txBody>
-      </p:sp>
-      <p:sp>
-        <p:nvSpPr>
-          <p:cNvPr id="4" name="New shape"/>
-          <p:cNvSpPr/>
-          <p:nvPr/>
-        </p:nvSpPr>
-        <p:spPr>
-          <a:xfrm>
-            <a:off x="586581" y="2361438"/>
-            <a:ext cx="11018838" cy="3996944"/>
-          </a:xfrm>
-          <a:prstGeom prst="rect">
-            <a:avLst/>
-          </a:prstGeom>
-          <a:noFill/>
-          <a:ln>
-            <a:noFill/>
-          </a:ln>
-        </p:spPr>
-        <p:style>
-          <a:lnRef idx="2">
-            <a:schemeClr val="accent1">
-              <a:shade val="50000"/>
-            </a:schemeClr>
-          </a:lnRef>
-          <a:fillRef idx="1">
-            <a:schemeClr val="accent1"/>
-          </a:fillRef>
-          <a:effectRef idx="0">
-            <a:schemeClr val="accent1"/>
-          </a:effectRef>
-          <a:fontRef idx="minor">
-            <a:schemeClr val="lt1"/>
-          </a:fontRef>
-        </p:style>
-        <p:txBody>
-          <a:bodyPr wrap="square" rtlCol="0" anchor="t"/>
-          <a:lstStyle/>
-          <a:p>
-            <a:pPr lvl="1" indent="-457200">
-              <a:spcAft>
-                <a:spcPct val="15000"/>
-              </a:spcAft>
-              <a:buAutoNum type="alphaUcPeriod"/>
-            </a:pPr>
-            <a:r>
-              <a:rPr sz="2500">
-                <a:solidFill>
-                  <a:srgbClr val="000000"/>
-                </a:solidFill>
-              </a:rPr>
-              <a:t>Send a patch file to maintainers via email</a:t>
-            </a:r>
-          </a:p>
-          <a:p>
-            <a:pPr lvl="1" indent="-457200">
-              <a:spcAft>
-                <a:spcPct val="15000"/>
-              </a:spcAft>
-              <a:buAutoNum type="alphaUcPeriod"/>
-            </a:pPr>
-            <a:r>
-              <a:rPr sz="2500">
-                <a:solidFill>
-                  <a:srgbClr val="000000"/>
-                </a:solidFill>
-              </a:rPr>
-              <a:t>Clone a repo, commit changes, and force push</a:t>
-            </a:r>
-          </a:p>
-          <a:p>
-            <a:pPr lvl="1" indent="-457200">
-              <a:spcAft>
-                <a:spcPct val="15000"/>
-              </a:spcAft>
-              <a:buAutoNum type="alphaUcPeriod"/>
-            </a:pPr>
-            <a:r>
-              <a:rPr sz="2500">
-                <a:solidFill>
-                  <a:srgbClr val="000000"/>
-                </a:solidFill>
-              </a:rPr>
-              <a:t>Get accepted as a team member</a:t>
-            </a:r>
-          </a:p>
-          <a:p>
-            <a:pPr lvl="1" indent="-457200">
-              <a:spcAft>
-                <a:spcPct val="15000"/>
-              </a:spcAft>
-              <a:buAutoNum type="alphaUcPeriod"/>
-            </a:pPr>
-            <a:r>
-              <a:rPr sz="2500">
-                <a:solidFill>
-                  <a:srgbClr val="000000"/>
-                </a:solidFill>
-              </a:rPr>
-              <a:t>Fork a repo, clone it, commit changes, and push to your fork</a:t>
-            </a:r>
-          </a:p>
-        </p:txBody>
-      </p:sp>
-    </p:spTree>
-  </p:cSld>
-  <p:clrMapOvr>
-    <a:masterClrMapping/>
-  </p:clrMapOvr>
-  <p:transition/>
-</p:sld>
-</file>
-
-<file path=ppt/slides/slide29.xml><?xml version="1.0" encoding="utf-8"?>
-<p:sld xmlns:a="http://schemas.openxmlformats.org/drawingml/2006/main" xmlns:r="http://schemas.openxmlformats.org/officeDocument/2006/relationships" xmlns:p="http://schemas.openxmlformats.org/presentationml/2006/main">
-  <p:cSld>
-    <p:spTree>
-      <p:nvGrpSpPr>
-        <p:cNvPr id="1" name=""/>
-        <p:cNvGrpSpPr/>
-        <p:nvPr/>
-      </p:nvGrpSpPr>
-      <p:grpSpPr>
-        <a:xfrm>
-          <a:off x="0" y="0"/>
-          <a:ext cx="0" cy="0"/>
-          <a:chOff x="0" y="0"/>
-          <a:chExt cx="0" cy="0"/>
-        </a:xfrm>
-      </p:grpSpPr>
-      <p:sp>
-        <p:nvSpPr>
-          <p:cNvPr id="2" name="Title"/>
-          <p:cNvSpPr>
-            <a:spLocks noGrp="1"/>
-          </p:cNvSpPr>
-          <p:nvPr>
-            <p:ph type="title"/>
-          </p:nvPr>
-        </p:nvSpPr>
-        <p:spPr>
-          <a:xfrm>
-            <a:off x="588263" y="457200"/>
-            <a:ext cx="11018520" cy="548640"/>
-          </a:xfrm>
-        </p:spPr>
-        <p:txBody>
-          <a:bodyPr/>
-          <a:lstStyle>
-            <a:lvl1pPr>
-              <a:defRPr>
-                <a:solidFill>
-                  <a:schemeClr val="tx1"/>
-                </a:solidFill>
-              </a:defRPr>
-            </a:lvl1pPr>
-          </a:lstStyle>
-          <a:p>
-            <a:r>
-              <a:rPr lang="en-US"/>
-              <a:t>Question 3</a:t>
-            </a:r>
-          </a:p>
-        </p:txBody>
-      </p:sp>
-      <p:sp>
-        <p:nvSpPr>
-          <p:cNvPr id="3" name="Subtitle"/>
-          <p:cNvSpPr>
-            <a:spLocks noGrp="1"/>
-          </p:cNvSpPr>
-          <p:nvPr>
-            <p:ph sz="quarter" idx="10"/>
-          </p:nvPr>
-        </p:nvSpPr>
-        <p:spPr>
-          <a:xfrm>
-            <a:off x="584200" y="1435100"/>
-            <a:ext cx="11018838" cy="426720"/>
-          </a:xfrm>
-        </p:spPr>
-        <p:txBody>
-          <a:bodyPr/>
-          <a:lstStyle>
-            <a:lvl1pPr marL="0" indent="0">
-              <a:buNone/>
-              <a:defRPr>
-                <a:solidFill>
-                  <a:schemeClr val="tx1"/>
-                </a:solidFill>
-              </a:defRPr>
-            </a:lvl1pPr>
-            <a:lvl2pPr>
-              <a:defRPr>
-                <a:solidFill>
-                  <a:schemeClr val="tx1"/>
-                </a:solidFill>
-              </a:defRPr>
-            </a:lvl2pPr>
-            <a:lvl3pPr>
-              <a:defRPr>
-                <a:solidFill>
-                  <a:schemeClr val="tx1"/>
-                </a:solidFill>
-              </a:defRPr>
-            </a:lvl3pPr>
-            <a:lvl4pPr>
-              <a:defRPr>
-                <a:solidFill>
-                  <a:schemeClr val="tx1"/>
-                </a:solidFill>
-              </a:defRPr>
-            </a:lvl4pPr>
-            <a:lvl5pPr>
-              <a:defRPr>
-                <a:solidFill>
-                  <a:schemeClr val="tx1"/>
-                </a:solidFill>
-              </a:defRPr>
-            </a:lvl5pPr>
-          </a:lstStyle>
-          <a:p>
-            <a:r>
-              <a:t>What is needed before you can create a pull request on GitHub?</a:t>
-            </a:r>
-          </a:p>
-        </p:txBody>
-      </p:sp>
-      <p:sp>
-        <p:nvSpPr>
-          <p:cNvPr id="4" name="New shape"/>
-          <p:cNvSpPr/>
-          <p:nvPr/>
-        </p:nvSpPr>
-        <p:spPr>
-          <a:xfrm>
-            <a:off x="586581" y="2361438"/>
-            <a:ext cx="11018838" cy="3996944"/>
-          </a:xfrm>
-          <a:prstGeom prst="rect">
-            <a:avLst/>
-          </a:prstGeom>
-          <a:noFill/>
-          <a:ln>
-            <a:noFill/>
-          </a:ln>
-        </p:spPr>
-        <p:style>
-          <a:lnRef idx="2">
-            <a:schemeClr val="accent1">
-              <a:shade val="50000"/>
-            </a:schemeClr>
-          </a:lnRef>
-          <a:fillRef idx="1">
-            <a:schemeClr val="accent1"/>
-          </a:fillRef>
-          <a:effectRef idx="0">
-            <a:schemeClr val="accent1"/>
-          </a:effectRef>
-          <a:fontRef idx="minor">
-            <a:schemeClr val="lt1"/>
-          </a:fontRef>
-        </p:style>
-        <p:txBody>
-          <a:bodyPr wrap="square" rtlCol="0" anchor="t"/>
-          <a:lstStyle/>
-          <a:p>
-            <a:pPr lvl="1" indent="-457200">
-              <a:spcAft>
-                <a:spcPct val="15000"/>
-              </a:spcAft>
-              <a:buAutoNum type="alphaUcPeriod"/>
-            </a:pPr>
-            <a:r>
-              <a:rPr sz="2500">
-                <a:solidFill>
-                  <a:srgbClr val="000000"/>
-                </a:solidFill>
-              </a:rPr>
-              <a:t>Send a patch file to maintainers via email</a:t>
-            </a:r>
-          </a:p>
-          <a:p>
-            <a:pPr lvl="1" indent="-457200">
-              <a:spcAft>
-                <a:spcPct val="15000"/>
-              </a:spcAft>
-              <a:buAutoNum type="alphaUcPeriod"/>
-            </a:pPr>
-            <a:r>
-              <a:rPr sz="2500">
-                <a:solidFill>
-                  <a:srgbClr val="000000"/>
-                </a:solidFill>
-              </a:rPr>
-              <a:t>Clone a repo, commit changes, and force push</a:t>
-            </a:r>
-          </a:p>
-          <a:p>
-            <a:pPr lvl="1" indent="-457200">
-              <a:spcAft>
-                <a:spcPct val="15000"/>
-              </a:spcAft>
-              <a:buAutoNum type="alphaUcPeriod"/>
-            </a:pPr>
-            <a:r>
-              <a:rPr sz="2500">
-                <a:solidFill>
-                  <a:srgbClr val="000000"/>
-                </a:solidFill>
-              </a:rPr>
-              <a:t>Get accepted as a team member</a:t>
-            </a:r>
-          </a:p>
-          <a:p>
-            <a:pPr lvl="1" indent="-457200">
-              <a:spcAft>
-                <a:spcPct val="15000"/>
-              </a:spcAft>
-              <a:buAutoNum type="alphaUcPeriod"/>
-            </a:pPr>
-            <a:r>
-              <a:rPr sz="2500" b="1">
-                <a:solidFill>
-                  <a:srgbClr val="000000"/>
-                </a:solidFill>
-                <a:highlight>
-                  <a:srgbClr val="F0F788"/>
-                </a:highlight>
-              </a:rPr>
-              <a:t>Fork a repo, clone it, commit changes, and push to your fork</a:t>
-            </a:r>
-          </a:p>
-        </p:txBody>
-      </p:sp>
     </p:spTree>
   </p:cSld>
   <p:clrMapOvr>
@@ -58938,559 +57481,6 @@
 </p:sld>
 </file>
 
-<file path=ppt/slides/slide30.xml><?xml version="1.0" encoding="utf-8"?>
-<p:sld xmlns:a="http://schemas.openxmlformats.org/drawingml/2006/main" xmlns:r="http://schemas.openxmlformats.org/officeDocument/2006/relationships" xmlns:p="http://schemas.openxmlformats.org/presentationml/2006/main">
-  <p:cSld>
-    <p:spTree>
-      <p:nvGrpSpPr>
-        <p:cNvPr id="1" name=""/>
-        <p:cNvGrpSpPr/>
-        <p:nvPr/>
-      </p:nvGrpSpPr>
-      <p:grpSpPr>
-        <a:xfrm>
-          <a:off x="0" y="0"/>
-          <a:ext cx="0" cy="0"/>
-          <a:chOff x="0" y="0"/>
-          <a:chExt cx="0" cy="0"/>
-        </a:xfrm>
-      </p:grpSpPr>
-      <p:sp>
-        <p:nvSpPr>
-          <p:cNvPr id="2" name="Title"/>
-          <p:cNvSpPr>
-            <a:spLocks noGrp="1"/>
-          </p:cNvSpPr>
-          <p:nvPr>
-            <p:ph type="title" hasCustomPrompt="1"/>
-          </p:nvPr>
-        </p:nvSpPr>
-        <p:spPr/>
-        <p:txBody>
-          <a:bodyPr wrap="square" lIns="0" tIns="0" rIns="0" bIns="0" anchor="b" anchorCtr="0">
-            <a:spAutoFit/>
-          </a:bodyPr>
-          <a:lstStyle>
-            <a:lvl1pPr algn="l" defTabSz="932742" rtl="0" eaLnBrk="1" latinLnBrk="0" hangingPunct="1">
-              <a:lnSpc>
-                <a:spcPct val="90000"/>
-              </a:lnSpc>
-              <a:spcBef>
-                <a:spcPct val="0"/>
-              </a:spcBef>
-              <a:buNone/>
-              <a:defRPr lang="en-US" sz="3600" b="0" kern="1200" cap="none" spc="-50" baseline="0">
-                <a:ln w="3175">
-                  <a:noFill/>
-                </a:ln>
-                <a:solidFill>
-                  <a:schemeClr val="tx1"/>
-                </a:solidFill>
-                <a:effectLst/>
-                <a:latin typeface="+mj-lt"/>
-                <a:ea typeface="+mn-ea"/>
-                <a:cs typeface="Segoe UI" pitchFamily="34" charset="0"/>
-              </a:defRPr>
-            </a:lvl1pPr>
-          </a:lstStyle>
-          <a:p>
-            <a:r>
-              <a:rPr lang="en-US"/>
-              <a:t>Summary</a:t>
-            </a:r>
-          </a:p>
-        </p:txBody>
-      </p:sp>
-    </p:spTree>
-  </p:cSld>
-  <p:clrMapOvr>
-    <a:masterClrMapping/>
-  </p:clrMapOvr>
-  <p:transition/>
-</p:sld>
-</file>
-
-<file path=ppt/slides/slide31.xml><?xml version="1.0" encoding="utf-8"?>
-<p:sld xmlns:a="http://schemas.openxmlformats.org/drawingml/2006/main" xmlns:r="http://schemas.openxmlformats.org/officeDocument/2006/relationships" xmlns:p="http://schemas.openxmlformats.org/presentationml/2006/main">
-  <p:cSld>
-    <p:spTree>
-      <p:nvGrpSpPr>
-        <p:cNvPr id="1" name=""/>
-        <p:cNvGrpSpPr/>
-        <p:nvPr/>
-      </p:nvGrpSpPr>
-      <p:grpSpPr>
-        <a:xfrm>
-          <a:off x="0" y="0"/>
-          <a:ext cx="0" cy="0"/>
-          <a:chOff x="0" y="0"/>
-          <a:chExt cx="0" cy="0"/>
-        </a:xfrm>
-      </p:grpSpPr>
-      <p:sp>
-        <p:nvSpPr>
-          <p:cNvPr id="2" name="Title"/>
-          <p:cNvSpPr>
-            <a:spLocks noGrp="1"/>
-          </p:cNvSpPr>
-          <p:nvPr>
-            <p:ph type="title"/>
-          </p:nvPr>
-        </p:nvSpPr>
-        <p:spPr>
-          <a:xfrm>
-            <a:off x="588263" y="457200"/>
-            <a:ext cx="11018520" cy="548640"/>
-          </a:xfrm>
-        </p:spPr>
-        <p:txBody>
-          <a:bodyPr/>
-          <a:lstStyle>
-            <a:lvl1pPr>
-              <a:defRPr>
-                <a:solidFill>
-                  <a:schemeClr val="tx1"/>
-                </a:solidFill>
-              </a:defRPr>
-            </a:lvl1pPr>
-          </a:lstStyle>
-          <a:p>
-            <a:r>
-              <a:rPr lang="en-US"/>
-              <a:t>Summary</a:t>
-            </a:r>
-          </a:p>
-        </p:txBody>
-      </p:sp>
-      <p:sp>
-        <p:nvSpPr>
-          <p:cNvPr id="3" name="Subtitle"/>
-          <p:cNvSpPr>
-            <a:spLocks noGrp="1"/>
-          </p:cNvSpPr>
-          <p:nvPr>
-            <p:ph sz="quarter" idx="10"/>
-          </p:nvPr>
-        </p:nvSpPr>
-        <p:spPr>
-          <a:xfrm>
-            <a:off x="584200" y="1435100"/>
-            <a:ext cx="11018838" cy="1292662"/>
-          </a:xfrm>
-        </p:spPr>
-        <p:txBody>
-          <a:bodyPr/>
-          <a:lstStyle>
-            <a:lvl1pPr marL="0" indent="0">
-              <a:buNone/>
-              <a:defRPr>
-                <a:solidFill>
-                  <a:schemeClr val="tx1"/>
-                </a:solidFill>
-              </a:defRPr>
-            </a:lvl1pPr>
-            <a:lvl2pPr>
-              <a:defRPr>
-                <a:solidFill>
-                  <a:schemeClr val="tx1"/>
-                </a:solidFill>
-              </a:defRPr>
-            </a:lvl2pPr>
-            <a:lvl3pPr>
-              <a:defRPr>
-                <a:solidFill>
-                  <a:schemeClr val="tx1"/>
-                </a:solidFill>
-              </a:defRPr>
-            </a:lvl3pPr>
-            <a:lvl4pPr>
-              <a:defRPr>
-                <a:solidFill>
-                  <a:schemeClr val="tx1"/>
-                </a:solidFill>
-              </a:defRPr>
-            </a:lvl4pPr>
-            <a:lvl5pPr>
-              <a:defRPr>
-                <a:solidFill>
-                  <a:schemeClr val="tx1"/>
-                </a:solidFill>
-              </a:defRPr>
-            </a:lvl5pPr>
-          </a:lstStyle>
-          <a:p>
-            <a:r>
-              <a:rPr dirty="0"/>
-              <a:t>In this module, you learned about the key features of GitHub</a:t>
-            </a:r>
-            <a:r>
-              <a:rPr lang="en-US" dirty="0"/>
-              <a:t> and how to use it with </a:t>
-            </a:r>
-            <a:r>
-              <a:rPr lang="en-US" dirty="0" err="1"/>
-              <a:t>GitHub.dev</a:t>
-            </a:r>
-            <a:r>
-              <a:rPr lang="en-US" dirty="0"/>
-              <a:t>,</a:t>
-            </a:r>
-            <a:r>
-              <a:rPr dirty="0"/>
-              <a:t> including commits,</a:t>
-            </a:r>
-            <a:r>
-              <a:rPr lang="en-US" dirty="0"/>
-              <a:t> branches,</a:t>
-            </a:r>
-            <a:r>
-              <a:rPr dirty="0"/>
-              <a:t> and pull requests.</a:t>
-            </a:r>
-          </a:p>
-        </p:txBody>
-      </p:sp>
-    </p:spTree>
-  </p:cSld>
-  <p:clrMapOvr>
-    <a:masterClrMapping/>
-  </p:clrMapOvr>
-  <p:transition/>
-</p:sld>
-</file>
-
-<file path=ppt/slides/slide32.xml><?xml version="1.0" encoding="utf-8"?>
-<p:sld xmlns:a="http://schemas.openxmlformats.org/drawingml/2006/main" xmlns:r="http://schemas.openxmlformats.org/officeDocument/2006/relationships" xmlns:p="http://schemas.openxmlformats.org/presentationml/2006/main">
-  <p:cSld>
-    <p:spTree>
-      <p:nvGrpSpPr>
-        <p:cNvPr id="1" name=""/>
-        <p:cNvGrpSpPr/>
-        <p:nvPr/>
-      </p:nvGrpSpPr>
-      <p:grpSpPr>
-        <a:xfrm>
-          <a:off x="0" y="0"/>
-          <a:ext cx="0" cy="0"/>
-          <a:chOff x="0" y="0"/>
-          <a:chExt cx="0" cy="0"/>
-        </a:xfrm>
-      </p:grpSpPr>
-      <p:sp>
-        <p:nvSpPr>
-          <p:cNvPr id="2" name="Title"/>
-          <p:cNvSpPr>
-            <a:spLocks noGrp="1"/>
-          </p:cNvSpPr>
-          <p:nvPr>
-            <p:ph type="title"/>
-          </p:nvPr>
-        </p:nvSpPr>
-        <p:spPr>
-          <a:xfrm>
-            <a:off x="588263" y="457200"/>
-            <a:ext cx="11018520" cy="548640"/>
-          </a:xfrm>
-        </p:spPr>
-        <p:txBody>
-          <a:bodyPr/>
-          <a:lstStyle>
-            <a:lvl1pPr>
-              <a:defRPr>
-                <a:solidFill>
-                  <a:schemeClr val="tx1"/>
-                </a:solidFill>
-              </a:defRPr>
-            </a:lvl1pPr>
-          </a:lstStyle>
-          <a:p>
-            <a:r>
-              <a:rPr lang="en-US"/>
-              <a:t>Learn more</a:t>
-            </a:r>
-          </a:p>
-        </p:txBody>
-      </p:sp>
-      <p:sp>
-        <p:nvSpPr>
-          <p:cNvPr id="3" name="Subtitle"/>
-          <p:cNvSpPr>
-            <a:spLocks noGrp="1"/>
-          </p:cNvSpPr>
-          <p:nvPr>
-            <p:ph sz="quarter" idx="10"/>
-          </p:nvPr>
-        </p:nvSpPr>
-        <p:spPr>
-          <a:xfrm>
-            <a:off x="584200" y="1435100"/>
-            <a:ext cx="11018838" cy="853440"/>
-          </a:xfrm>
-        </p:spPr>
-        <p:txBody>
-          <a:bodyPr/>
-          <a:lstStyle>
-            <a:lvl1pPr marL="0" indent="0">
-              <a:buNone/>
-              <a:defRPr>
-                <a:solidFill>
-                  <a:schemeClr val="tx1"/>
-                </a:solidFill>
-              </a:defRPr>
-            </a:lvl1pPr>
-            <a:lvl2pPr>
-              <a:defRPr>
-                <a:solidFill>
-                  <a:schemeClr val="tx1"/>
-                </a:solidFill>
-              </a:defRPr>
-            </a:lvl2pPr>
-            <a:lvl3pPr>
-              <a:defRPr>
-                <a:solidFill>
-                  <a:schemeClr val="tx1"/>
-                </a:solidFill>
-              </a:defRPr>
-            </a:lvl3pPr>
-            <a:lvl4pPr>
-              <a:defRPr>
-                <a:solidFill>
-                  <a:schemeClr val="tx1"/>
-                </a:solidFill>
-              </a:defRPr>
-            </a:lvl4pPr>
-            <a:lvl5pPr>
-              <a:defRPr>
-                <a:solidFill>
-                  <a:schemeClr val="tx1"/>
-                </a:solidFill>
-              </a:defRPr>
-            </a:lvl5pPr>
-          </a:lstStyle>
-          <a:p>
-            <a:r>
-              <a:t>Here are some links to more information on the topics we discussed in this module.</a:t>
-            </a:r>
-          </a:p>
-        </p:txBody>
-      </p:sp>
-      <p:sp>
-        <p:nvSpPr>
-          <p:cNvPr id="4" name="New shape"/>
-          <p:cNvSpPr/>
-          <p:nvPr/>
-        </p:nvSpPr>
-        <p:spPr>
-          <a:xfrm>
-            <a:off x="609600" y="2517013"/>
-            <a:ext cx="10972800" cy="2670048"/>
-          </a:xfrm>
-          <a:prstGeom prst="rect">
-            <a:avLst/>
-          </a:prstGeom>
-          <a:noFill/>
-          <a:ln>
-            <a:noFill/>
-          </a:ln>
-        </p:spPr>
-        <p:style>
-          <a:lnRef idx="2">
-            <a:schemeClr val="accent1">
-              <a:shade val="50000"/>
-            </a:schemeClr>
-          </a:lnRef>
-          <a:fillRef idx="1">
-            <a:schemeClr val="accent1"/>
-          </a:fillRef>
-          <a:effectRef idx="0">
-            <a:schemeClr val="accent1"/>
-          </a:effectRef>
-          <a:fontRef idx="minor">
-            <a:schemeClr val="lt1"/>
-          </a:fontRef>
-        </p:style>
-        <p:txBody>
-          <a:bodyPr rtlCol="0" anchor="ctr">
-            <a:spAutoFit/>
-          </a:bodyPr>
-          <a:lstStyle/>
-          <a:p>
-            <a:pPr marL="635000" indent="-365760">
-              <a:spcBef>
-                <a:spcPct val="20000"/>
-              </a:spcBef>
-              <a:spcAft>
-                <a:spcPct val="20000"/>
-              </a:spcAft>
-              <a:buChar char="•"/>
-            </a:pPr>
-            <a:r>
-              <a:rPr sz="1800">
-                <a:solidFill>
-                  <a:srgbClr val="000000"/>
-                </a:solidFill>
-                <a:hlinkClick r:id="rId3"/>
-              </a:rPr>
-              <a:t>Setting up and managing organizations and teams</a:t>
-            </a:r>
-          </a:p>
-          <a:p>
-            <a:pPr marL="635000" indent="-365760">
-              <a:spcBef>
-                <a:spcPct val="20000"/>
-              </a:spcBef>
-              <a:spcAft>
-                <a:spcPct val="20000"/>
-              </a:spcAft>
-              <a:buChar char="•"/>
-            </a:pPr>
-            <a:r>
-              <a:rPr sz="1800">
-                <a:solidFill>
-                  <a:srgbClr val="000000"/>
-                </a:solidFill>
-                <a:hlinkClick r:id="rId4"/>
-              </a:rPr>
-              <a:t>Committing changes to your project</a:t>
-            </a:r>
-          </a:p>
-          <a:p>
-            <a:pPr marL="635000" indent="-365760">
-              <a:spcBef>
-                <a:spcPct val="20000"/>
-              </a:spcBef>
-              <a:spcAft>
-                <a:spcPct val="20000"/>
-              </a:spcAft>
-              <a:buChar char="•"/>
-            </a:pPr>
-            <a:r>
-              <a:rPr sz="1800">
-                <a:solidFill>
-                  <a:srgbClr val="000000"/>
-                </a:solidFill>
-                <a:hlinkClick r:id="rId5"/>
-              </a:rPr>
-              <a:t>Collaborating with issues and pull requests</a:t>
-            </a:r>
-          </a:p>
-          <a:p>
-            <a:pPr marL="635000" indent="-365760">
-              <a:spcBef>
-                <a:spcPct val="20000"/>
-              </a:spcBef>
-              <a:spcAft>
-                <a:spcPct val="20000"/>
-              </a:spcAft>
-              <a:buChar char="•"/>
-            </a:pPr>
-            <a:r>
-              <a:rPr sz="1800">
-                <a:solidFill>
-                  <a:srgbClr val="000000"/>
-                </a:solidFill>
-                <a:hlinkClick r:id="rId6"/>
-              </a:rPr>
-              <a:t>About the role of labels</a:t>
-            </a:r>
-          </a:p>
-          <a:p>
-            <a:pPr marL="635000" indent="-365760">
-              <a:spcBef>
-                <a:spcPct val="20000"/>
-              </a:spcBef>
-              <a:spcAft>
-                <a:spcPct val="20000"/>
-              </a:spcAft>
-              <a:buChar char="•"/>
-            </a:pPr>
-            <a:r>
-              <a:rPr sz="1800">
-                <a:solidFill>
-                  <a:srgbClr val="000000"/>
-                </a:solidFill>
-                <a:hlinkClick r:id="rId7"/>
-              </a:rPr>
-              <a:t>GitHub Actions</a:t>
-            </a:r>
-          </a:p>
-          <a:p>
-            <a:pPr marL="635000" indent="-365760">
-              <a:spcBef>
-                <a:spcPct val="20000"/>
-              </a:spcBef>
-              <a:spcAft>
-                <a:spcPct val="20000"/>
-              </a:spcAft>
-              <a:buChar char="•"/>
-            </a:pPr>
-            <a:r>
-              <a:rPr sz="1800">
-                <a:solidFill>
-                  <a:srgbClr val="000000"/>
-                </a:solidFill>
-                <a:hlinkClick r:id="rId8"/>
-              </a:rPr>
-              <a:t>Fork a repo</a:t>
-            </a:r>
-          </a:p>
-          <a:p>
-            <a:pPr marL="635000" indent="-365760">
-              <a:spcBef>
-                <a:spcPct val="20000"/>
-              </a:spcBef>
-              <a:spcAft>
-                <a:spcPct val="20000"/>
-              </a:spcAft>
-              <a:buChar char="•"/>
-            </a:pPr>
-            <a:r>
-              <a:rPr sz="1800">
-                <a:solidFill>
-                  <a:srgbClr val="000000"/>
-                </a:solidFill>
-                <a:hlinkClick r:id="rId9"/>
-              </a:rPr>
-              <a:t>Working with GitHub Pages</a:t>
-            </a:r>
-          </a:p>
-        </p:txBody>
-      </p:sp>
-    </p:spTree>
-  </p:cSld>
-  <p:clrMapOvr>
-    <a:masterClrMapping/>
-  </p:clrMapOvr>
-  <p:transition/>
-</p:sld>
-</file>
-
-<file path=ppt/slides/slide33.xml><?xml version="1.0" encoding="utf-8"?>
-<p:sld xmlns:a="http://schemas.openxmlformats.org/drawingml/2006/main" xmlns:r="http://schemas.openxmlformats.org/officeDocument/2006/relationships" xmlns:p="http://schemas.openxmlformats.org/presentationml/2006/main">
-  <p:cSld>
-    <p:spTree>
-      <p:nvGrpSpPr>
-        <p:cNvPr id="1" name=""/>
-        <p:cNvGrpSpPr/>
-        <p:nvPr/>
-      </p:nvGrpSpPr>
-      <p:grpSpPr>
-        <a:xfrm>
-          <a:off x="0" y="0"/>
-          <a:ext cx="0" cy="0"/>
-          <a:chOff x="0" y="0"/>
-          <a:chExt cx="0" cy="0"/>
-        </a:xfrm>
-      </p:grpSpPr>
-    </p:spTree>
-  </p:cSld>
-  <p:clrMapOvr>
-    <a:masterClrMapping/>
-  </p:clrMapOvr>
-  <p:transition/>
-</p:sld>
-</file>
-
 <file path=ppt/slides/slide4.xml><?xml version="1.0" encoding="utf-8"?>
 <p:sld xmlns:a="http://schemas.openxmlformats.org/drawingml/2006/main" xmlns:r="http://schemas.openxmlformats.org/officeDocument/2006/relationships" xmlns:p="http://schemas.openxmlformats.org/presentationml/2006/main">
   <p:cSld>
@@ -59728,7 +57718,7 @@
         <p:spPr>
           <a:xfrm>
             <a:off x="4356100" y="2309812"/>
-            <a:ext cx="7253288" cy="2154436"/>
+            <a:ext cx="7253288" cy="1785104"/>
           </a:xfrm>
         </p:spPr>
         <p:txBody>
@@ -59761,13 +57751,6 @@
             <a:pPr lvl="1"/>
             <a:r>
               <a:rPr lang="en-US" dirty="0"/>
-              <a:t>Pre-Quiz</a:t>
-            </a:r>
-          </a:p>
-          <a:p>
-            <a:pPr lvl="1"/>
-            <a:r>
-              <a:rPr lang="en-US" dirty="0"/>
               <a:t>Work in </a:t>
             </a:r>
             <a:r>
@@ -59780,7 +57763,7 @@
             <a:pPr lvl="1"/>
             <a:r>
               <a:rPr lang="en-US" dirty="0"/>
-              <a:t>Post-Quiz</a:t>
+              <a:t>Quiz</a:t>
             </a:r>
           </a:p>
           <a:p>

</xml_diff>